<commit_message>
split up some slices and reorder
</commit_message>
<xml_diff>
--- a/doc/presentation.pptx
+++ b/doc/presentation.pptx
@@ -5,21 +5,24 @@
     <p:sldMasterId id="2147483649" r:id="rId1"/>
   </p:sldMasterIdLst>
   <p:notesMasterIdLst>
-    <p:notesMasterId r:id="rId14"/>
+    <p:notesMasterId r:id="rId17"/>
   </p:notesMasterIdLst>
   <p:sldIdLst>
     <p:sldId id="256" r:id="rId2"/>
-    <p:sldId id="310" r:id="rId3"/>
-    <p:sldId id="309" r:id="rId4"/>
-    <p:sldId id="298" r:id="rId5"/>
-    <p:sldId id="301" r:id="rId6"/>
-    <p:sldId id="302" r:id="rId7"/>
-    <p:sldId id="303" r:id="rId8"/>
-    <p:sldId id="304" r:id="rId9"/>
-    <p:sldId id="305" r:id="rId10"/>
-    <p:sldId id="306" r:id="rId11"/>
-    <p:sldId id="307" r:id="rId12"/>
-    <p:sldId id="308" r:id="rId13"/>
+    <p:sldId id="311" r:id="rId3"/>
+    <p:sldId id="310" r:id="rId4"/>
+    <p:sldId id="312" r:id="rId5"/>
+    <p:sldId id="309" r:id="rId6"/>
+    <p:sldId id="298" r:id="rId7"/>
+    <p:sldId id="301" r:id="rId8"/>
+    <p:sldId id="303" r:id="rId9"/>
+    <p:sldId id="314" r:id="rId10"/>
+    <p:sldId id="305" r:id="rId11"/>
+    <p:sldId id="304" r:id="rId12"/>
+    <p:sldId id="306" r:id="rId13"/>
+    <p:sldId id="307" r:id="rId14"/>
+    <p:sldId id="308" r:id="rId15"/>
+    <p:sldId id="313" r:id="rId16"/>
   </p:sldIdLst>
   <p:sldSz cx="9144000" cy="6858000" type="screen4x3"/>
   <p:notesSz cx="7099300" cy="10234613"/>
@@ -3239,7 +3242,7 @@
           <a:p>
             <a:r>
               <a:rPr lang="de-DE" dirty="0" smtClean="0"/>
-              <a:t>Item</a:t>
+              <a:t>Set User Grants</a:t>
             </a:r>
             <a:endParaRPr lang="de-DE" dirty="0"/>
           </a:p>
@@ -3261,37 +3264,43 @@
           <a:lstStyle/>
           <a:p>
             <a:r>
-              <a:rPr lang="de-DE" dirty="0" smtClean="0"/>
-              <a:t>Create</a:t>
-            </a:r>
-          </a:p>
-          <a:p>
-            <a:r>
-              <a:rPr lang="de-DE" dirty="0" err="1" smtClean="0"/>
-              <a:t>Submit</a:t>
-            </a:r>
-            <a:r>
-              <a:rPr lang="de-DE" dirty="0" smtClean="0"/>
-              <a:t> (incl. Release)</a:t>
-            </a:r>
-          </a:p>
-          <a:p>
-            <a:r>
-              <a:rPr lang="de-DE" dirty="0" smtClean="0"/>
-              <a:t>Update</a:t>
-            </a:r>
-          </a:p>
-          <a:p>
-            <a:r>
-              <a:rPr lang="de-DE" dirty="0" err="1" smtClean="0"/>
-              <a:t>Submit</a:t>
+              <a:rPr lang="de-DE" dirty="0" err="1" smtClean="0"/>
+              <a:t>Define</a:t>
+            </a:r>
+            <a:r>
+              <a:rPr lang="de-DE" dirty="0" smtClean="0"/>
+              <a:t> </a:t>
+            </a:r>
+            <a:r>
+              <a:rPr lang="de-DE" dirty="0" err="1" smtClean="0"/>
+              <a:t>used</a:t>
+            </a:r>
+            <a:r>
+              <a:rPr lang="de-DE" dirty="0" smtClean="0"/>
+              <a:t> </a:t>
+            </a:r>
+            <a:r>
+              <a:rPr lang="de-DE" dirty="0" err="1" smtClean="0"/>
+              <a:t>Role</a:t>
             </a:r>
             <a:endParaRPr lang="de-DE" dirty="0" smtClean="0"/>
           </a:p>
           <a:p>
             <a:r>
               <a:rPr lang="de-DE" dirty="0" err="1" smtClean="0"/>
-              <a:t>release</a:t>
+              <a:t>Define</a:t>
+            </a:r>
+            <a:r>
+              <a:rPr lang="de-DE" dirty="0" smtClean="0"/>
+              <a:t> </a:t>
+            </a:r>
+            <a:r>
+              <a:rPr lang="de-DE" dirty="0" smtClean="0"/>
+              <a:t>valid </a:t>
+            </a:r>
+            <a:r>
+              <a:rPr lang="de-DE" dirty="0" err="1" smtClean="0"/>
+              <a:t>Context</a:t>
             </a:r>
             <a:endParaRPr lang="de-DE" dirty="0" smtClean="0"/>
           </a:p>
@@ -3300,7 +3309,55 @@
             <a:endParaRPr lang="de-DE" dirty="0" smtClean="0"/>
           </a:p>
           <a:p>
-            <a:endParaRPr lang="de-DE" dirty="0"/>
+            <a:r>
+              <a:rPr lang="de-DE" dirty="0" err="1" smtClean="0"/>
+              <a:t>Retrieve</a:t>
+            </a:r>
+            <a:r>
+              <a:rPr lang="de-DE" dirty="0" smtClean="0"/>
+              <a:t/>
+            </a:r>
+            <a:br>
+              <a:rPr lang="de-DE" dirty="0" smtClean="0"/>
+            </a:br>
+            <a:r>
+              <a:rPr lang="de-DE" sz="2000" dirty="0" smtClean="0">
+                <a:latin typeface="Courier New" pitchFamily="49" charset="0"/>
+                <a:cs typeface="Courier New" pitchFamily="49" charset="0"/>
+              </a:rPr>
+              <a:t>http://&lt;host&gt;/aa/user-account/&lt;objid&gt;/</a:t>
+            </a:r>
+            <a:br>
+              <a:rPr lang="de-DE" sz="2000" dirty="0" smtClean="0">
+                <a:latin typeface="Courier New" pitchFamily="49" charset="0"/>
+                <a:cs typeface="Courier New" pitchFamily="49" charset="0"/>
+              </a:rPr>
+            </a:br>
+            <a:r>
+              <a:rPr lang="de-DE" sz="2000" dirty="0" err="1" smtClean="0">
+                <a:latin typeface="Courier New" pitchFamily="49" charset="0"/>
+                <a:cs typeface="Courier New" pitchFamily="49" charset="0"/>
+              </a:rPr>
+              <a:t>resources</a:t>
+            </a:r>
+            <a:r>
+              <a:rPr lang="de-DE" sz="2000" dirty="0" smtClean="0">
+                <a:latin typeface="Courier New" pitchFamily="49" charset="0"/>
+                <a:cs typeface="Courier New" pitchFamily="49" charset="0"/>
+              </a:rPr>
+              <a:t>/</a:t>
+            </a:r>
+            <a:r>
+              <a:rPr lang="de-DE" sz="2000" dirty="0" err="1" smtClean="0">
+                <a:latin typeface="Courier New" pitchFamily="49" charset="0"/>
+                <a:cs typeface="Courier New" pitchFamily="49" charset="0"/>
+              </a:rPr>
+              <a:t>current-grants</a:t>
+            </a:r>
+            <a:endParaRPr lang="de-DE" sz="2000" dirty="0">
+              <a:latin typeface="Courier New" pitchFamily="49" charset="0"/>
+              <a:cs typeface="Courier New" pitchFamily="49" charset="0"/>
+            </a:endParaRPr>
           </a:p>
         </p:txBody>
       </p:sp>
@@ -3349,7 +3406,7 @@
           <a:p>
             <a:r>
               <a:rPr lang="de-DE" dirty="0" smtClean="0"/>
-              <a:t>Container</a:t>
+              <a:t>Content Model</a:t>
             </a:r>
             <a:endParaRPr lang="de-DE" dirty="0"/>
           </a:p>
@@ -3371,35 +3428,49 @@
           <a:lstStyle/>
           <a:p>
             <a:r>
-              <a:rPr lang="de-DE" dirty="0" smtClean="0"/>
-              <a:t>Create</a:t>
-            </a:r>
-          </a:p>
-          <a:p>
-            <a:r>
-              <a:rPr lang="de-DE" dirty="0" err="1" smtClean="0"/>
-              <a:t>Submit</a:t>
-            </a:r>
-            <a:r>
-              <a:rPr lang="de-DE" dirty="0" smtClean="0"/>
-              <a:t> (incl. Release)</a:t>
-            </a:r>
-          </a:p>
-          <a:p>
-            <a:r>
-              <a:rPr lang="de-DE" dirty="0" smtClean="0"/>
-              <a:t>Update</a:t>
-            </a:r>
-          </a:p>
-          <a:p>
-            <a:r>
-              <a:rPr lang="de-DE" dirty="0" err="1" smtClean="0"/>
-              <a:t>Submit</a:t>
-            </a:r>
-            <a:r>
-              <a:rPr lang="de-DE" dirty="0" smtClean="0"/>
-              <a:t> (incl. Release)</a:t>
-            </a:r>
+              <a:rPr lang="de-DE" dirty="0" err="1" smtClean="0"/>
+              <a:t>Define</a:t>
+            </a:r>
+            <a:r>
+              <a:rPr lang="de-DE" dirty="0" smtClean="0"/>
+              <a:t> </a:t>
+            </a:r>
+            <a:r>
+              <a:rPr lang="de-DE" dirty="0" err="1" smtClean="0"/>
+              <a:t>properties</a:t>
+            </a:r>
+            <a:endParaRPr lang="de-DE" dirty="0" smtClean="0"/>
+          </a:p>
+          <a:p>
+            <a:pPr lvl="1"/>
+            <a:r>
+              <a:rPr lang="de-DE" dirty="0" smtClean="0"/>
+              <a:t>Name</a:t>
+            </a:r>
+          </a:p>
+          <a:p>
+            <a:r>
+              <a:rPr lang="de-DE" dirty="0" err="1" smtClean="0"/>
+              <a:t>Retrieve</a:t>
+            </a:r>
+            <a:r>
+              <a:rPr lang="de-DE" dirty="0" smtClean="0"/>
+              <a:t/>
+            </a:r>
+            <a:br>
+              <a:rPr lang="de-DE" dirty="0" smtClean="0"/>
+            </a:br>
+            <a:r>
+              <a:rPr lang="de-DE" sz="2000" dirty="0" smtClean="0">
+                <a:latin typeface="Courier New" pitchFamily="49" charset="0"/>
+                <a:cs typeface="Courier New" pitchFamily="49" charset="0"/>
+              </a:rPr>
+              <a:t>http://&lt;host&gt;/cmm/content-model/&lt;objid&gt;</a:t>
+            </a:r>
+            <a:endParaRPr lang="de-DE" sz="2000" dirty="0">
+              <a:latin typeface="Courier New" pitchFamily="49" charset="0"/>
+              <a:cs typeface="Courier New" pitchFamily="49" charset="0"/>
+            </a:endParaRPr>
           </a:p>
         </p:txBody>
       </p:sp>
@@ -3448,7 +3519,7 @@
           <a:p>
             <a:r>
               <a:rPr lang="de-DE" dirty="0" smtClean="0"/>
-              <a:t>Second Container</a:t>
+              <a:t>Item</a:t>
             </a:r>
             <a:endParaRPr lang="de-DE" dirty="0"/>
           </a:p>
@@ -3470,6 +3541,227 @@
           <a:lstStyle/>
           <a:p>
             <a:r>
+              <a:rPr lang="de-DE" dirty="0" smtClean="0"/>
+              <a:t>Create</a:t>
+            </a:r>
+          </a:p>
+          <a:p>
+            <a:r>
+              <a:rPr lang="de-DE" dirty="0" err="1" smtClean="0"/>
+              <a:t>Submit</a:t>
+            </a:r>
+            <a:endParaRPr lang="de-DE" dirty="0" smtClean="0"/>
+          </a:p>
+          <a:p>
+            <a:r>
+              <a:rPr lang="de-DE" dirty="0" smtClean="0"/>
+              <a:t>Release</a:t>
+            </a:r>
+            <a:endParaRPr lang="de-DE" dirty="0" smtClean="0"/>
+          </a:p>
+          <a:p>
+            <a:r>
+              <a:rPr lang="de-DE" dirty="0" smtClean="0"/>
+              <a:t>Update</a:t>
+            </a:r>
+          </a:p>
+          <a:p>
+            <a:r>
+              <a:rPr lang="de-DE" dirty="0" err="1" smtClean="0"/>
+              <a:t>Submit</a:t>
+            </a:r>
+            <a:endParaRPr lang="de-DE" dirty="0" smtClean="0"/>
+          </a:p>
+          <a:p>
+            <a:r>
+              <a:rPr lang="de-DE" dirty="0" err="1" smtClean="0"/>
+              <a:t>release</a:t>
+            </a:r>
+            <a:endParaRPr lang="de-DE" dirty="0" smtClean="0"/>
+          </a:p>
+          <a:p>
+            <a:pPr lvl="1"/>
+            <a:endParaRPr lang="de-DE" dirty="0" smtClean="0"/>
+          </a:p>
+          <a:p>
+            <a:endParaRPr lang="de-DE" dirty="0"/>
+          </a:p>
+        </p:txBody>
+      </p:sp>
+    </p:spTree>
+  </p:cSld>
+  <p:clrMapOvr>
+    <a:masterClrMapping/>
+  </p:clrMapOvr>
+  <p:transition>
+    <p:fade/>
+  </p:transition>
+</p:sld>
+</file>
+
+<file path=ppt/slides/slide13.xml><?xml version="1.0" encoding="utf-8"?>
+<p:sld xmlns:a="http://schemas.openxmlformats.org/drawingml/2006/main" xmlns:r="http://schemas.openxmlformats.org/officeDocument/2006/relationships" xmlns:p="http://schemas.openxmlformats.org/presentationml/2006/main">
+  <p:cSld>
+    <p:spTree>
+      <p:nvGrpSpPr>
+        <p:cNvPr id="1" name=""/>
+        <p:cNvGrpSpPr/>
+        <p:nvPr/>
+      </p:nvGrpSpPr>
+      <p:grpSpPr>
+        <a:xfrm>
+          <a:off x="0" y="0"/>
+          <a:ext cx="0" cy="0"/>
+          <a:chOff x="0" y="0"/>
+          <a:chExt cx="0" cy="0"/>
+        </a:xfrm>
+      </p:grpSpPr>
+      <p:sp>
+        <p:nvSpPr>
+          <p:cNvPr id="2" name="Titel 1"/>
+          <p:cNvSpPr>
+            <a:spLocks noGrp="1"/>
+          </p:cNvSpPr>
+          <p:nvPr>
+            <p:ph type="title"/>
+          </p:nvPr>
+        </p:nvSpPr>
+        <p:spPr/>
+        <p:txBody>
+          <a:bodyPr/>
+          <a:lstStyle/>
+          <a:p>
+            <a:r>
+              <a:rPr lang="de-DE" dirty="0" smtClean="0"/>
+              <a:t>Container</a:t>
+            </a:r>
+            <a:endParaRPr lang="de-DE" dirty="0"/>
+          </a:p>
+        </p:txBody>
+      </p:sp>
+      <p:sp>
+        <p:nvSpPr>
+          <p:cNvPr id="3" name="Inhaltsplatzhalter 2"/>
+          <p:cNvSpPr>
+            <a:spLocks noGrp="1"/>
+          </p:cNvSpPr>
+          <p:nvPr>
+            <p:ph idx="1"/>
+          </p:nvPr>
+        </p:nvSpPr>
+        <p:spPr/>
+        <p:txBody>
+          <a:bodyPr/>
+          <a:lstStyle/>
+          <a:p>
+            <a:r>
+              <a:rPr lang="de-DE" dirty="0" smtClean="0"/>
+              <a:t>Create</a:t>
+            </a:r>
+          </a:p>
+          <a:p>
+            <a:r>
+              <a:rPr lang="de-DE" dirty="0" err="1" smtClean="0"/>
+              <a:t>Submit</a:t>
+            </a:r>
+            <a:endParaRPr lang="de-DE" dirty="0" smtClean="0"/>
+          </a:p>
+          <a:p>
+            <a:r>
+              <a:rPr lang="de-DE" dirty="0" smtClean="0"/>
+              <a:t>Release</a:t>
+            </a:r>
+            <a:endParaRPr lang="de-DE" dirty="0" smtClean="0"/>
+          </a:p>
+          <a:p>
+            <a:r>
+              <a:rPr lang="de-DE" dirty="0" smtClean="0"/>
+              <a:t>Update</a:t>
+            </a:r>
+          </a:p>
+          <a:p>
+            <a:r>
+              <a:rPr lang="de-DE" dirty="0" err="1" smtClean="0"/>
+              <a:t>Submit</a:t>
+            </a:r>
+            <a:endParaRPr lang="de-DE" dirty="0" smtClean="0"/>
+          </a:p>
+          <a:p>
+            <a:r>
+              <a:rPr lang="de-DE" smtClean="0"/>
+              <a:t>Release</a:t>
+            </a:r>
+            <a:endParaRPr lang="de-DE" dirty="0" smtClean="0"/>
+          </a:p>
+        </p:txBody>
+      </p:sp>
+    </p:spTree>
+  </p:cSld>
+  <p:clrMapOvr>
+    <a:masterClrMapping/>
+  </p:clrMapOvr>
+  <p:transition>
+    <p:fade/>
+  </p:transition>
+</p:sld>
+</file>
+
+<file path=ppt/slides/slide14.xml><?xml version="1.0" encoding="utf-8"?>
+<p:sld xmlns:a="http://schemas.openxmlformats.org/drawingml/2006/main" xmlns:r="http://schemas.openxmlformats.org/officeDocument/2006/relationships" xmlns:p="http://schemas.openxmlformats.org/presentationml/2006/main">
+  <p:cSld>
+    <p:spTree>
+      <p:nvGrpSpPr>
+        <p:cNvPr id="1" name=""/>
+        <p:cNvGrpSpPr/>
+        <p:nvPr/>
+      </p:nvGrpSpPr>
+      <p:grpSpPr>
+        <a:xfrm>
+          <a:off x="0" y="0"/>
+          <a:ext cx="0" cy="0"/>
+          <a:chOff x="0" y="0"/>
+          <a:chExt cx="0" cy="0"/>
+        </a:xfrm>
+      </p:grpSpPr>
+      <p:sp>
+        <p:nvSpPr>
+          <p:cNvPr id="2" name="Titel 1"/>
+          <p:cNvSpPr>
+            <a:spLocks noGrp="1"/>
+          </p:cNvSpPr>
+          <p:nvPr>
+            <p:ph type="title"/>
+          </p:nvPr>
+        </p:nvSpPr>
+        <p:spPr/>
+        <p:txBody>
+          <a:bodyPr/>
+          <a:lstStyle/>
+          <a:p>
+            <a:r>
+              <a:rPr lang="de-DE" dirty="0" smtClean="0"/>
+              <a:t>Second Container</a:t>
+            </a:r>
+            <a:endParaRPr lang="de-DE" dirty="0"/>
+          </a:p>
+        </p:txBody>
+      </p:sp>
+      <p:sp>
+        <p:nvSpPr>
+          <p:cNvPr id="3" name="Inhaltsplatzhalter 2"/>
+          <p:cNvSpPr>
+            <a:spLocks noGrp="1"/>
+          </p:cNvSpPr>
+          <p:nvPr>
+            <p:ph idx="1"/>
+          </p:nvPr>
+        </p:nvSpPr>
+        <p:spPr/>
+        <p:txBody>
+          <a:bodyPr/>
+          <a:lstStyle/>
+          <a:p>
+            <a:r>
               <a:rPr lang="de-DE" dirty="0" err="1" smtClean="0"/>
               <a:t>create</a:t>
             </a:r>
@@ -3497,6 +3789,127 @@
           </a:p>
           <a:p>
             <a:endParaRPr lang="de-DE" dirty="0"/>
+          </a:p>
+        </p:txBody>
+      </p:sp>
+    </p:spTree>
+  </p:cSld>
+  <p:clrMapOvr>
+    <a:masterClrMapping/>
+  </p:clrMapOvr>
+  <p:transition>
+    <p:fade/>
+  </p:transition>
+</p:sld>
+</file>
+
+<file path=ppt/slides/slide15.xml><?xml version="1.0" encoding="utf-8"?>
+<p:sld xmlns:a="http://schemas.openxmlformats.org/drawingml/2006/main" xmlns:r="http://schemas.openxmlformats.org/officeDocument/2006/relationships" xmlns:p="http://schemas.openxmlformats.org/presentationml/2006/main">
+  <p:cSld>
+    <p:spTree>
+      <p:nvGrpSpPr>
+        <p:cNvPr id="1" name=""/>
+        <p:cNvGrpSpPr/>
+        <p:nvPr/>
+      </p:nvGrpSpPr>
+      <p:grpSpPr>
+        <a:xfrm>
+          <a:off x="0" y="0"/>
+          <a:ext cx="0" cy="0"/>
+          <a:chOff x="0" y="0"/>
+          <a:chExt cx="0" cy="0"/>
+        </a:xfrm>
+      </p:grpSpPr>
+      <p:sp>
+        <p:nvSpPr>
+          <p:cNvPr id="2" name="Titel 1"/>
+          <p:cNvSpPr>
+            <a:spLocks noGrp="1"/>
+          </p:cNvSpPr>
+          <p:nvPr>
+            <p:ph type="title"/>
+          </p:nvPr>
+        </p:nvSpPr>
+        <p:spPr/>
+        <p:txBody>
+          <a:bodyPr/>
+          <a:lstStyle/>
+          <a:p>
+            <a:r>
+              <a:rPr lang="de-DE" dirty="0" err="1" smtClean="0"/>
+              <a:t>Organizational</a:t>
+            </a:r>
+            <a:r>
+              <a:rPr lang="de-DE" dirty="0" smtClean="0"/>
+              <a:t> Unit </a:t>
+            </a:r>
+            <a:r>
+              <a:rPr lang="de-DE" dirty="0" err="1" smtClean="0"/>
+              <a:t>Hierarchy</a:t>
+            </a:r>
+            <a:endParaRPr lang="de-DE" dirty="0"/>
+          </a:p>
+        </p:txBody>
+      </p:sp>
+      <p:sp>
+        <p:nvSpPr>
+          <p:cNvPr id="3" name="Inhaltsplatzhalter 2"/>
+          <p:cNvSpPr>
+            <a:spLocks noGrp="1"/>
+          </p:cNvSpPr>
+          <p:nvPr>
+            <p:ph idx="1"/>
+          </p:nvPr>
+        </p:nvSpPr>
+        <p:spPr/>
+        <p:txBody>
+          <a:bodyPr/>
+          <a:lstStyle/>
+          <a:p>
+            <a:r>
+              <a:rPr lang="de-DE" dirty="0" smtClean="0"/>
+              <a:t>Create </a:t>
+            </a:r>
+            <a:r>
+              <a:rPr lang="de-DE" dirty="0" err="1" smtClean="0"/>
+              <a:t>second</a:t>
+            </a:r>
+            <a:r>
+              <a:rPr lang="de-DE" dirty="0" smtClean="0"/>
+              <a:t> OU </a:t>
+            </a:r>
+            <a:r>
+              <a:rPr lang="de-DE" dirty="0" err="1" smtClean="0"/>
+              <a:t>as</a:t>
+            </a:r>
+            <a:r>
+              <a:rPr lang="de-DE" dirty="0" smtClean="0"/>
+              <a:t> </a:t>
+            </a:r>
+            <a:r>
+              <a:rPr lang="de-DE" dirty="0" err="1" smtClean="0"/>
+              <a:t>child</a:t>
+            </a:r>
+            <a:r>
+              <a:rPr lang="de-DE" dirty="0" smtClean="0"/>
+              <a:t> </a:t>
+            </a:r>
+            <a:r>
+              <a:rPr lang="de-DE" dirty="0" err="1" smtClean="0"/>
+              <a:t>of</a:t>
+            </a:r>
+            <a:r>
+              <a:rPr lang="de-DE" dirty="0" smtClean="0"/>
+              <a:t> </a:t>
+            </a:r>
+            <a:r>
+              <a:rPr lang="de-DE" dirty="0" err="1" smtClean="0"/>
+              <a:t>first</a:t>
+            </a:r>
+            <a:r>
+              <a:rPr lang="de-DE" dirty="0" smtClean="0"/>
+              <a:t> OU </a:t>
+            </a:r>
           </a:p>
         </p:txBody>
       </p:sp>
@@ -3561,62 +3974,29 @@
             <p:ph idx="1"/>
           </p:nvPr>
         </p:nvSpPr>
-        <p:spPr>
-          <a:xfrm>
-            <a:off x="1219200" y="2214554"/>
-            <a:ext cx="7315200" cy="3576646"/>
-          </a:xfrm>
-        </p:spPr>
+        <p:spPr/>
         <p:txBody>
           <a:bodyPr/>
           <a:lstStyle/>
           <a:p>
             <a:r>
               <a:rPr lang="de-DE" dirty="0" smtClean="0"/>
-              <a:t>eSciDoc </a:t>
-            </a:r>
-            <a:r>
-              <a:rPr lang="de-DE" dirty="0" smtClean="0"/>
-              <a:t>Resources</a:t>
-            </a:r>
-          </a:p>
-          <a:p>
-            <a:pPr lvl="1"/>
-            <a:r>
-              <a:rPr lang="de-DE" dirty="0" err="1" smtClean="0"/>
-              <a:t>Organizational</a:t>
-            </a:r>
-            <a:r>
-              <a:rPr lang="de-DE" dirty="0" smtClean="0"/>
-              <a:t> Unit</a:t>
-            </a:r>
-          </a:p>
-          <a:p>
-            <a:pPr lvl="1"/>
-            <a:r>
-              <a:rPr lang="de-DE" dirty="0" smtClean="0"/>
-              <a:t>User, Grants</a:t>
-            </a:r>
-          </a:p>
-          <a:p>
-            <a:pPr lvl="1"/>
-            <a:r>
-              <a:rPr lang="de-DE" dirty="0" err="1" smtClean="0"/>
-              <a:t>Context</a:t>
+              <a:t>eSciDoc XML </a:t>
+            </a:r>
+            <a:r>
+              <a:rPr lang="de-DE" dirty="0" err="1" smtClean="0"/>
+              <a:t>r</a:t>
+            </a:r>
+            <a:r>
+              <a:rPr lang="de-DE" dirty="0" err="1" smtClean="0"/>
+              <a:t>epresentation</a:t>
             </a:r>
             <a:endParaRPr lang="de-DE" dirty="0" smtClean="0"/>
           </a:p>
           <a:p>
-            <a:pPr lvl="1"/>
-            <a:r>
-              <a:rPr lang="de-DE" dirty="0" smtClean="0"/>
-              <a:t>Item, Container, …</a:t>
-            </a:r>
-          </a:p>
-          <a:p>
-            <a:r>
-              <a:rPr lang="de-DE" dirty="0" err="1" smtClean="0"/>
-              <a:t>Example</a:t>
+            <a:r>
+              <a:rPr lang="de-DE" dirty="0" err="1" smtClean="0"/>
+              <a:t>Structure</a:t>
             </a:r>
             <a:r>
               <a:rPr lang="de-DE" dirty="0" smtClean="0"/>
@@ -3624,23 +4004,52 @@
             </a:r>
             <a:r>
               <a:rPr lang="de-DE" dirty="0" err="1" smtClean="0"/>
-              <a:t>Package</a:t>
+              <a:t>of</a:t>
+            </a:r>
+            <a:r>
+              <a:rPr lang="de-DE" dirty="0" smtClean="0"/>
+              <a:t> </a:t>
+            </a:r>
+            <a:r>
+              <a:rPr lang="de-DE" dirty="0" err="1" smtClean="0"/>
+              <a:t>e</a:t>
+            </a:r>
+            <a:r>
+              <a:rPr lang="de-DE" dirty="0" err="1" smtClean="0"/>
+              <a:t>xample</a:t>
+            </a:r>
+            <a:r>
+              <a:rPr lang="de-DE" dirty="0" smtClean="0"/>
+              <a:t> </a:t>
+            </a:r>
+            <a:r>
+              <a:rPr lang="de-DE" dirty="0" err="1" smtClean="0"/>
+              <a:t>package</a:t>
             </a:r>
             <a:endParaRPr lang="de-DE" dirty="0" smtClean="0"/>
           </a:p>
           <a:p>
-            <a:pPr lvl="1"/>
-            <a:r>
-              <a:rPr lang="de-DE" dirty="0" smtClean="0"/>
-              <a:t>Class Mapping</a:t>
-            </a:r>
-          </a:p>
-          <a:p>
-            <a:pPr lvl="1"/>
-            <a:r>
-              <a:rPr lang="de-DE" dirty="0" smtClean="0"/>
-              <a:t>REST Handler</a:t>
-            </a:r>
+            <a:r>
+              <a:rPr lang="de-DE" dirty="0" err="1" smtClean="0"/>
+              <a:t>Creation</a:t>
+            </a:r>
+            <a:r>
+              <a:rPr lang="de-DE" dirty="0" smtClean="0"/>
+              <a:t> </a:t>
+            </a:r>
+            <a:r>
+              <a:rPr lang="de-DE" dirty="0" err="1" smtClean="0"/>
+              <a:t>of</a:t>
+            </a:r>
+            <a:r>
+              <a:rPr lang="de-DE" dirty="0" smtClean="0"/>
+              <a:t> eSciDoc </a:t>
+            </a:r>
+            <a:r>
+              <a:rPr lang="de-DE" dirty="0" err="1" smtClean="0"/>
+              <a:t>resources</a:t>
+            </a:r>
+            <a:endParaRPr lang="de-DE" dirty="0" smtClean="0"/>
           </a:p>
           <a:p>
             <a:endParaRPr lang="de-DE" dirty="0"/>
@@ -3659,6 +4068,293 @@
 </file>
 
 <file path=ppt/slides/slide3.xml><?xml version="1.0" encoding="utf-8"?>
+<p:sld xmlns:a="http://schemas.openxmlformats.org/drawingml/2006/main" xmlns:r="http://schemas.openxmlformats.org/officeDocument/2006/relationships" xmlns:p="http://schemas.openxmlformats.org/presentationml/2006/main">
+  <p:cSld>
+    <p:spTree>
+      <p:nvGrpSpPr>
+        <p:cNvPr id="1" name=""/>
+        <p:cNvGrpSpPr/>
+        <p:nvPr/>
+      </p:nvGrpSpPr>
+      <p:grpSpPr>
+        <a:xfrm>
+          <a:off x="0" y="0"/>
+          <a:ext cx="0" cy="0"/>
+          <a:chOff x="0" y="0"/>
+          <a:chExt cx="0" cy="0"/>
+        </a:xfrm>
+      </p:grpSpPr>
+      <p:sp>
+        <p:nvSpPr>
+          <p:cNvPr id="2" name="Titel 1"/>
+          <p:cNvSpPr>
+            <a:spLocks noGrp="1"/>
+          </p:cNvSpPr>
+          <p:nvPr>
+            <p:ph type="title"/>
+          </p:nvPr>
+        </p:nvSpPr>
+        <p:spPr/>
+        <p:txBody>
+          <a:bodyPr/>
+          <a:lstStyle/>
+          <a:p>
+            <a:r>
+              <a:rPr lang="de-DE" dirty="0" smtClean="0"/>
+              <a:t>eSciDoc </a:t>
+            </a:r>
+            <a:r>
+              <a:rPr lang="de-DE" dirty="0" smtClean="0"/>
+              <a:t>Resources</a:t>
+            </a:r>
+            <a:endParaRPr lang="de-DE" dirty="0"/>
+          </a:p>
+        </p:txBody>
+      </p:sp>
+      <p:sp>
+        <p:nvSpPr>
+          <p:cNvPr id="3" name="Inhaltsplatzhalter 2"/>
+          <p:cNvSpPr>
+            <a:spLocks noGrp="1"/>
+          </p:cNvSpPr>
+          <p:nvPr>
+            <p:ph idx="1"/>
+          </p:nvPr>
+        </p:nvSpPr>
+        <p:spPr>
+          <a:xfrm>
+            <a:off x="1219200" y="2214554"/>
+            <a:ext cx="7315200" cy="3576646"/>
+          </a:xfrm>
+        </p:spPr>
+        <p:txBody>
+          <a:bodyPr/>
+          <a:lstStyle/>
+          <a:p>
+            <a:r>
+              <a:rPr lang="de-DE" dirty="0" err="1" smtClean="0"/>
+              <a:t>Organizational</a:t>
+            </a:r>
+            <a:r>
+              <a:rPr lang="de-DE" dirty="0" smtClean="0"/>
+              <a:t> </a:t>
+            </a:r>
+            <a:r>
+              <a:rPr lang="de-DE" dirty="0" smtClean="0"/>
+              <a:t>Unit</a:t>
+            </a:r>
+          </a:p>
+          <a:p>
+            <a:r>
+              <a:rPr lang="de-DE" dirty="0" smtClean="0"/>
+              <a:t>User, Grants</a:t>
+            </a:r>
+          </a:p>
+          <a:p>
+            <a:r>
+              <a:rPr lang="de-DE" dirty="0" err="1" smtClean="0"/>
+              <a:t>Context</a:t>
+            </a:r>
+            <a:endParaRPr lang="de-DE" dirty="0" smtClean="0"/>
+          </a:p>
+          <a:p>
+            <a:r>
+              <a:rPr lang="de-DE" dirty="0" smtClean="0"/>
+              <a:t>Item</a:t>
+            </a:r>
+          </a:p>
+          <a:p>
+            <a:r>
+              <a:rPr lang="de-DE" dirty="0" smtClean="0"/>
+              <a:t>Container</a:t>
+            </a:r>
+          </a:p>
+          <a:p>
+            <a:r>
+              <a:rPr lang="de-DE" dirty="0" smtClean="0"/>
+              <a:t>…</a:t>
+            </a:r>
+            <a:endParaRPr lang="de-DE" dirty="0" smtClean="0"/>
+          </a:p>
+          <a:p>
+            <a:endParaRPr lang="de-DE" dirty="0"/>
+          </a:p>
+        </p:txBody>
+      </p:sp>
+    </p:spTree>
+  </p:cSld>
+  <p:clrMapOvr>
+    <a:masterClrMapping/>
+  </p:clrMapOvr>
+  <p:transition>
+    <p:fade/>
+  </p:transition>
+</p:sld>
+</file>
+
+<file path=ppt/slides/slide4.xml><?xml version="1.0" encoding="utf-8"?>
+<p:sld xmlns:a="http://schemas.openxmlformats.org/drawingml/2006/main" xmlns:r="http://schemas.openxmlformats.org/officeDocument/2006/relationships" xmlns:p="http://schemas.openxmlformats.org/presentationml/2006/main">
+  <p:cSld>
+    <p:spTree>
+      <p:nvGrpSpPr>
+        <p:cNvPr id="1" name=""/>
+        <p:cNvGrpSpPr/>
+        <p:nvPr/>
+      </p:nvGrpSpPr>
+      <p:grpSpPr>
+        <a:xfrm>
+          <a:off x="0" y="0"/>
+          <a:ext cx="0" cy="0"/>
+          <a:chOff x="0" y="0"/>
+          <a:chExt cx="0" cy="0"/>
+        </a:xfrm>
+      </p:grpSpPr>
+      <p:sp>
+        <p:nvSpPr>
+          <p:cNvPr id="2" name="Titel 1"/>
+          <p:cNvSpPr>
+            <a:spLocks noGrp="1"/>
+          </p:cNvSpPr>
+          <p:nvPr>
+            <p:ph type="title"/>
+          </p:nvPr>
+        </p:nvSpPr>
+        <p:spPr/>
+        <p:txBody>
+          <a:bodyPr/>
+          <a:lstStyle/>
+          <a:p>
+            <a:r>
+              <a:rPr lang="de-DE" dirty="0" err="1" smtClean="0"/>
+              <a:t>Structure</a:t>
+            </a:r>
+            <a:r>
+              <a:rPr lang="de-DE" dirty="0" smtClean="0"/>
+              <a:t> </a:t>
+            </a:r>
+            <a:r>
+              <a:rPr lang="de-DE" dirty="0" err="1" smtClean="0"/>
+              <a:t>of</a:t>
+            </a:r>
+            <a:r>
+              <a:rPr lang="de-DE" dirty="0" smtClean="0"/>
+              <a:t> </a:t>
+            </a:r>
+            <a:r>
+              <a:rPr lang="de-DE" dirty="0" err="1" smtClean="0"/>
+              <a:t>example</a:t>
+            </a:r>
+            <a:r>
+              <a:rPr lang="de-DE" dirty="0" smtClean="0"/>
+              <a:t> </a:t>
+            </a:r>
+            <a:r>
+              <a:rPr lang="de-DE" dirty="0" err="1" smtClean="0"/>
+              <a:t>Package</a:t>
+            </a:r>
+            <a:r>
+              <a:rPr lang="de-DE" dirty="0" smtClean="0"/>
+              <a:t/>
+            </a:r>
+            <a:br>
+              <a:rPr lang="de-DE" dirty="0" smtClean="0"/>
+            </a:br>
+            <a:endParaRPr lang="de-DE" dirty="0"/>
+          </a:p>
+        </p:txBody>
+      </p:sp>
+      <p:sp>
+        <p:nvSpPr>
+          <p:cNvPr id="3" name="Inhaltsplatzhalter 2"/>
+          <p:cNvSpPr>
+            <a:spLocks noGrp="1"/>
+          </p:cNvSpPr>
+          <p:nvPr>
+            <p:ph idx="1"/>
+          </p:nvPr>
+        </p:nvSpPr>
+        <p:spPr/>
+        <p:txBody>
+          <a:bodyPr/>
+          <a:lstStyle/>
+          <a:p>
+            <a:r>
+              <a:rPr lang="de-DE" dirty="0" smtClean="0"/>
+              <a:t>Class </a:t>
+            </a:r>
+            <a:r>
+              <a:rPr lang="de-DE" dirty="0" smtClean="0"/>
+              <a:t>Mapping</a:t>
+            </a:r>
+          </a:p>
+          <a:p>
+            <a:r>
+              <a:rPr lang="de-DE" dirty="0" smtClean="0"/>
+              <a:t>REST </a:t>
+            </a:r>
+            <a:r>
+              <a:rPr lang="de-DE" dirty="0" smtClean="0"/>
+              <a:t>Handler</a:t>
+            </a:r>
+          </a:p>
+          <a:p>
+            <a:r>
+              <a:rPr lang="de-DE" dirty="0" smtClean="0"/>
+              <a:t>Templates</a:t>
+            </a:r>
+          </a:p>
+          <a:p>
+            <a:r>
+              <a:rPr lang="de-DE" dirty="0" err="1" smtClean="0"/>
+              <a:t>Structure</a:t>
+            </a:r>
+            <a:r>
+              <a:rPr lang="de-DE" dirty="0" smtClean="0"/>
+              <a:t> </a:t>
+            </a:r>
+            <a:r>
+              <a:rPr lang="de-DE" dirty="0" err="1" smtClean="0"/>
+              <a:t>of</a:t>
+            </a:r>
+            <a:r>
+              <a:rPr lang="de-DE" dirty="0" smtClean="0"/>
+              <a:t> </a:t>
+            </a:r>
+            <a:r>
+              <a:rPr lang="de-DE" dirty="0" err="1" smtClean="0"/>
+              <a:t>e</a:t>
+            </a:r>
+            <a:r>
+              <a:rPr lang="de-DE" dirty="0" err="1" smtClean="0"/>
+              <a:t>xample</a:t>
+            </a:r>
+            <a:r>
+              <a:rPr lang="de-DE" dirty="0" smtClean="0"/>
+              <a:t> </a:t>
+            </a:r>
+            <a:r>
+              <a:rPr lang="de-DE" dirty="0" err="1" smtClean="0"/>
+              <a:t>classes</a:t>
+            </a:r>
+            <a:endParaRPr lang="de-DE" dirty="0" smtClean="0"/>
+          </a:p>
+          <a:p>
+            <a:endParaRPr lang="de-DE" dirty="0"/>
+          </a:p>
+        </p:txBody>
+      </p:sp>
+    </p:spTree>
+  </p:cSld>
+  <p:clrMapOvr>
+    <a:masterClrMapping/>
+  </p:clrMapOvr>
+  <p:transition>
+    <p:fade/>
+  </p:transition>
+</p:sld>
+</file>
+
+<file path=ppt/slides/slide5.xml><?xml version="1.0" encoding="utf-8"?>
 <p:sld xmlns:a="http://schemas.openxmlformats.org/drawingml/2006/main" xmlns:r="http://schemas.openxmlformats.org/officeDocument/2006/relationships" xmlns:p="http://schemas.openxmlformats.org/presentationml/2006/main">
   <p:cSld>
     <p:spTree>
@@ -3721,453 +4417,6 @@
 </p:sld>
 </file>
 
-<file path=ppt/slides/slide4.xml><?xml version="1.0" encoding="utf-8"?>
-<p:sld xmlns:a="http://schemas.openxmlformats.org/drawingml/2006/main" xmlns:r="http://schemas.openxmlformats.org/officeDocument/2006/relationships" xmlns:p="http://schemas.openxmlformats.org/presentationml/2006/main">
-  <p:cSld>
-    <p:spTree>
-      <p:nvGrpSpPr>
-        <p:cNvPr id="1" name=""/>
-        <p:cNvGrpSpPr/>
-        <p:nvPr/>
-      </p:nvGrpSpPr>
-      <p:grpSpPr>
-        <a:xfrm>
-          <a:off x="0" y="0"/>
-          <a:ext cx="0" cy="0"/>
-          <a:chOff x="0" y="0"/>
-          <a:chExt cx="0" cy="0"/>
-        </a:xfrm>
-      </p:grpSpPr>
-      <p:sp>
-        <p:nvSpPr>
-          <p:cNvPr id="2" name="Titel 1"/>
-          <p:cNvSpPr>
-            <a:spLocks noGrp="1"/>
-          </p:cNvSpPr>
-          <p:nvPr>
-            <p:ph type="title"/>
-          </p:nvPr>
-        </p:nvSpPr>
-        <p:spPr/>
-        <p:txBody>
-          <a:bodyPr/>
-          <a:lstStyle/>
-          <a:p>
-            <a:r>
-              <a:rPr lang="de-DE" dirty="0" err="1" smtClean="0"/>
-              <a:t>Creating</a:t>
-            </a:r>
-            <a:r>
-              <a:rPr lang="de-DE" dirty="0" smtClean="0"/>
-              <a:t> </a:t>
-            </a:r>
-            <a:r>
-              <a:rPr lang="de-DE" dirty="0" err="1" smtClean="0"/>
-              <a:t>of</a:t>
-            </a:r>
-            <a:r>
-              <a:rPr lang="de-DE" dirty="0" smtClean="0"/>
-              <a:t> </a:t>
-            </a:r>
-            <a:r>
-              <a:rPr lang="de-DE" dirty="0" err="1" smtClean="0"/>
-              <a:t>the</a:t>
-            </a:r>
-            <a:r>
-              <a:rPr lang="de-DE" dirty="0" smtClean="0"/>
-              <a:t> Basic Objects</a:t>
-            </a:r>
-            <a:endParaRPr lang="de-DE" dirty="0"/>
-          </a:p>
-        </p:txBody>
-      </p:sp>
-      <p:sp>
-        <p:nvSpPr>
-          <p:cNvPr id="3" name="Inhaltsplatzhalter 2"/>
-          <p:cNvSpPr>
-            <a:spLocks noGrp="1"/>
-          </p:cNvSpPr>
-          <p:nvPr>
-            <p:ph idx="1"/>
-          </p:nvPr>
-        </p:nvSpPr>
-        <p:spPr/>
-        <p:txBody>
-          <a:bodyPr/>
-          <a:lstStyle/>
-          <a:p>
-            <a:r>
-              <a:rPr lang="de-DE" dirty="0" smtClean="0"/>
-              <a:t>Create </a:t>
-            </a:r>
-            <a:r>
-              <a:rPr lang="de-DE" dirty="0" err="1" smtClean="0"/>
-              <a:t>Organizational</a:t>
-            </a:r>
-            <a:r>
-              <a:rPr lang="de-DE" dirty="0" smtClean="0"/>
-              <a:t> Unit</a:t>
-            </a:r>
-          </a:p>
-          <a:p>
-            <a:r>
-              <a:rPr lang="de-DE" dirty="0" smtClean="0"/>
-              <a:t>Create User</a:t>
-            </a:r>
-          </a:p>
-          <a:p>
-            <a:r>
-              <a:rPr lang="de-DE" dirty="0" smtClean="0"/>
-              <a:t>Create </a:t>
-            </a:r>
-            <a:r>
-              <a:rPr lang="de-DE" dirty="0" err="1" smtClean="0"/>
-              <a:t>Context</a:t>
-            </a:r>
-            <a:endParaRPr lang="de-DE" dirty="0" smtClean="0"/>
-          </a:p>
-          <a:p>
-            <a:r>
-              <a:rPr lang="de-DE" dirty="0" smtClean="0"/>
-              <a:t>Create Content Model</a:t>
-            </a:r>
-          </a:p>
-          <a:p>
-            <a:r>
-              <a:rPr lang="de-DE" dirty="0" smtClean="0"/>
-              <a:t>Set </a:t>
-            </a:r>
-            <a:r>
-              <a:rPr lang="de-DE" dirty="0" err="1" smtClean="0"/>
-              <a:t>user</a:t>
-            </a:r>
-            <a:r>
-              <a:rPr lang="de-DE" dirty="0" smtClean="0"/>
-              <a:t> </a:t>
-            </a:r>
-            <a:r>
-              <a:rPr lang="de-DE" dirty="0" err="1" smtClean="0"/>
-              <a:t>grant</a:t>
-            </a:r>
-            <a:r>
-              <a:rPr lang="de-DE" dirty="0" smtClean="0"/>
-              <a:t/>
-            </a:r>
-            <a:br>
-              <a:rPr lang="de-DE" dirty="0" smtClean="0"/>
-            </a:br>
-            <a:endParaRPr lang="de-DE" dirty="0" smtClean="0"/>
-          </a:p>
-          <a:p>
-            <a:r>
-              <a:rPr lang="de-DE" dirty="0" smtClean="0"/>
-              <a:t>Create Item </a:t>
-            </a:r>
-            <a:r>
-              <a:rPr lang="de-DE" dirty="0" err="1" smtClean="0"/>
-              <a:t>and</a:t>
-            </a:r>
-            <a:r>
-              <a:rPr lang="de-DE" dirty="0" smtClean="0"/>
-              <a:t> Container</a:t>
-            </a:r>
-          </a:p>
-          <a:p>
-            <a:endParaRPr lang="de-DE" dirty="0"/>
-          </a:p>
-        </p:txBody>
-      </p:sp>
-    </p:spTree>
-  </p:cSld>
-  <p:clrMapOvr>
-    <a:masterClrMapping/>
-  </p:clrMapOvr>
-  <p:transition>
-    <p:fade/>
-  </p:transition>
-</p:sld>
-</file>
-
-<file path=ppt/slides/slide5.xml><?xml version="1.0" encoding="utf-8"?>
-<p:sld xmlns:a="http://schemas.openxmlformats.org/drawingml/2006/main" xmlns:r="http://schemas.openxmlformats.org/officeDocument/2006/relationships" xmlns:p="http://schemas.openxmlformats.org/presentationml/2006/main">
-  <p:cSld>
-    <p:spTree>
-      <p:nvGrpSpPr>
-        <p:cNvPr id="1" name=""/>
-        <p:cNvGrpSpPr/>
-        <p:nvPr/>
-      </p:nvGrpSpPr>
-      <p:grpSpPr>
-        <a:xfrm>
-          <a:off x="0" y="0"/>
-          <a:ext cx="0" cy="0"/>
-          <a:chOff x="0" y="0"/>
-          <a:chExt cx="0" cy="0"/>
-        </a:xfrm>
-      </p:grpSpPr>
-      <p:sp>
-        <p:nvSpPr>
-          <p:cNvPr id="2" name="Titel 1"/>
-          <p:cNvSpPr>
-            <a:spLocks noGrp="1"/>
-          </p:cNvSpPr>
-          <p:nvPr>
-            <p:ph type="title"/>
-          </p:nvPr>
-        </p:nvSpPr>
-        <p:spPr/>
-        <p:txBody>
-          <a:bodyPr/>
-          <a:lstStyle/>
-          <a:p>
-            <a:r>
-              <a:rPr lang="de-DE" dirty="0" err="1" smtClean="0"/>
-              <a:t>Organizational</a:t>
-            </a:r>
-            <a:r>
-              <a:rPr lang="de-DE" dirty="0" smtClean="0"/>
-              <a:t> Unit (OU)</a:t>
-            </a:r>
-            <a:endParaRPr lang="de-DE" dirty="0"/>
-          </a:p>
-        </p:txBody>
-      </p:sp>
-      <p:sp>
-        <p:nvSpPr>
-          <p:cNvPr id="3" name="Inhaltsplatzhalter 2"/>
-          <p:cNvSpPr>
-            <a:spLocks noGrp="1"/>
-          </p:cNvSpPr>
-          <p:nvPr>
-            <p:ph idx="1"/>
-          </p:nvPr>
-        </p:nvSpPr>
-        <p:spPr/>
-        <p:txBody>
-          <a:bodyPr/>
-          <a:lstStyle/>
-          <a:p>
-            <a:r>
-              <a:rPr lang="de-DE" dirty="0" err="1" smtClean="0"/>
-              <a:t>Define</a:t>
-            </a:r>
-            <a:r>
-              <a:rPr lang="de-DE" dirty="0" smtClean="0"/>
-              <a:t> OU </a:t>
-            </a:r>
-            <a:r>
-              <a:rPr lang="de-DE" dirty="0" err="1" smtClean="0"/>
-              <a:t>properties</a:t>
-            </a:r>
-            <a:endParaRPr lang="de-DE" dirty="0" smtClean="0"/>
-          </a:p>
-          <a:p>
-            <a:r>
-              <a:rPr lang="de-DE" dirty="0" err="1" smtClean="0"/>
-              <a:t>Created</a:t>
-            </a:r>
-            <a:r>
-              <a:rPr lang="de-DE" dirty="0" smtClean="0"/>
-              <a:t> </a:t>
-            </a:r>
-            <a:r>
-              <a:rPr lang="de-DE" dirty="0" err="1" smtClean="0"/>
-              <a:t>by</a:t>
-            </a:r>
-            <a:r>
-              <a:rPr lang="de-DE" dirty="0" smtClean="0"/>
-              <a:t> </a:t>
-            </a:r>
-            <a:r>
-              <a:rPr lang="de-DE" dirty="0" err="1" smtClean="0"/>
-              <a:t>user</a:t>
-            </a:r>
-            <a:r>
-              <a:rPr lang="de-DE" dirty="0" smtClean="0"/>
-              <a:t> </a:t>
-            </a:r>
-            <a:r>
-              <a:rPr lang="de-DE" dirty="0" err="1" smtClean="0"/>
-              <a:t>with</a:t>
-            </a:r>
-            <a:r>
-              <a:rPr lang="de-DE" dirty="0" smtClean="0"/>
-              <a:t> </a:t>
-            </a:r>
-            <a:r>
-              <a:rPr lang="de-DE" dirty="0" err="1" smtClean="0"/>
-              <a:t>system</a:t>
-            </a:r>
-            <a:r>
-              <a:rPr lang="de-DE" dirty="0" smtClean="0"/>
-              <a:t> </a:t>
-            </a:r>
-            <a:r>
-              <a:rPr lang="de-DE" dirty="0" err="1" smtClean="0"/>
-              <a:t>administrator</a:t>
-            </a:r>
-            <a:r>
-              <a:rPr lang="de-DE" dirty="0" smtClean="0"/>
-              <a:t> </a:t>
-            </a:r>
-            <a:r>
-              <a:rPr lang="de-DE" dirty="0" err="1" smtClean="0"/>
-              <a:t>grants</a:t>
-            </a:r>
-            <a:endParaRPr lang="de-DE" dirty="0" smtClean="0"/>
-          </a:p>
-          <a:p>
-            <a:r>
-              <a:rPr lang="de-DE" dirty="0" smtClean="0"/>
-              <a:t>Set </a:t>
-            </a:r>
-            <a:r>
-              <a:rPr lang="de-DE" dirty="0" err="1" smtClean="0"/>
-              <a:t>status</a:t>
-            </a:r>
-            <a:r>
-              <a:rPr lang="de-DE" dirty="0" smtClean="0"/>
-              <a:t> </a:t>
-            </a:r>
-            <a:r>
-              <a:rPr lang="de-DE" dirty="0" err="1" smtClean="0"/>
-              <a:t>of</a:t>
-            </a:r>
-            <a:r>
-              <a:rPr lang="de-DE" dirty="0" smtClean="0"/>
-              <a:t> OU </a:t>
-            </a:r>
-            <a:r>
-              <a:rPr lang="de-DE" dirty="0" err="1" smtClean="0"/>
-              <a:t>to</a:t>
-            </a:r>
-            <a:r>
-              <a:rPr lang="de-DE" dirty="0" smtClean="0"/>
-              <a:t> open</a:t>
-            </a:r>
-            <a:br>
-              <a:rPr lang="de-DE" dirty="0" smtClean="0"/>
-            </a:br>
-            <a:endParaRPr lang="de-DE" dirty="0" smtClean="0"/>
-          </a:p>
-          <a:p>
-            <a:r>
-              <a:rPr lang="de-DE" dirty="0" smtClean="0"/>
-              <a:t>Create </a:t>
-            </a:r>
-            <a:r>
-              <a:rPr lang="de-DE" dirty="0" err="1" smtClean="0"/>
-              <a:t>second</a:t>
-            </a:r>
-            <a:r>
-              <a:rPr lang="de-DE" dirty="0" smtClean="0"/>
-              <a:t> OU </a:t>
-            </a:r>
-            <a:r>
-              <a:rPr lang="de-DE" dirty="0" err="1" smtClean="0"/>
-              <a:t>as</a:t>
-            </a:r>
-            <a:r>
-              <a:rPr lang="de-DE" dirty="0" smtClean="0"/>
-              <a:t> </a:t>
-            </a:r>
-            <a:r>
-              <a:rPr lang="de-DE" dirty="0" err="1" smtClean="0"/>
-              <a:t>child</a:t>
-            </a:r>
-            <a:r>
-              <a:rPr lang="de-DE" dirty="0" smtClean="0"/>
-              <a:t> </a:t>
-            </a:r>
-            <a:r>
-              <a:rPr lang="de-DE" dirty="0" err="1" smtClean="0"/>
-              <a:t>of</a:t>
-            </a:r>
-            <a:r>
-              <a:rPr lang="de-DE" dirty="0" smtClean="0"/>
-              <a:t> </a:t>
-            </a:r>
-            <a:r>
-              <a:rPr lang="de-DE" dirty="0" err="1" smtClean="0"/>
-              <a:t>first</a:t>
-            </a:r>
-            <a:r>
-              <a:rPr lang="de-DE" dirty="0" smtClean="0"/>
-              <a:t> OU </a:t>
-            </a:r>
-          </a:p>
-          <a:p>
-            <a:pPr lvl="1"/>
-            <a:r>
-              <a:rPr lang="de-DE" dirty="0" smtClean="0"/>
-              <a:t>(optional) just </a:t>
-            </a:r>
-            <a:r>
-              <a:rPr lang="de-DE" dirty="0" err="1" smtClean="0"/>
-              <a:t>to</a:t>
-            </a:r>
-            <a:r>
-              <a:rPr lang="de-DE" dirty="0" smtClean="0"/>
-              <a:t> </a:t>
-            </a:r>
-            <a:r>
-              <a:rPr lang="de-DE" dirty="0" err="1" smtClean="0"/>
-              <a:t>show</a:t>
-            </a:r>
-            <a:r>
-              <a:rPr lang="de-DE" dirty="0" smtClean="0"/>
-              <a:t> OU </a:t>
-            </a:r>
-            <a:r>
-              <a:rPr lang="en-US" dirty="0" smtClean="0"/>
-              <a:t>hierarchy</a:t>
-            </a:r>
-            <a:br>
-              <a:rPr lang="en-US" dirty="0" smtClean="0"/>
-            </a:br>
-            <a:endParaRPr lang="en-US" dirty="0" smtClean="0"/>
-          </a:p>
-          <a:p>
-            <a:r>
-              <a:rPr lang="de-DE" dirty="0" err="1" smtClean="0"/>
-              <a:t>Retrieve</a:t>
-            </a:r>
-            <a:r>
-              <a:rPr lang="de-DE" dirty="0" smtClean="0"/>
-              <a:t>:</a:t>
-            </a:r>
-            <a:br>
-              <a:rPr lang="de-DE" dirty="0" smtClean="0"/>
-            </a:br>
-            <a:r>
-              <a:rPr lang="de-DE" dirty="0" smtClean="0">
-                <a:latin typeface="Courier New" pitchFamily="49" charset="0"/>
-                <a:cs typeface="Courier New" pitchFamily="49" charset="0"/>
-              </a:rPr>
-              <a:t>http://&lt;host&gt;/oum/organizational-unit/&lt;objid&gt; </a:t>
-            </a:r>
-            <a:r>
-              <a:rPr lang="de-DE" dirty="0" smtClean="0"/>
-              <a:t/>
-            </a:r>
-            <a:br>
-              <a:rPr lang="de-DE" dirty="0" smtClean="0"/>
-            </a:br>
-            <a:endParaRPr lang="de-DE" dirty="0"/>
-          </a:p>
-        </p:txBody>
-      </p:sp>
-    </p:spTree>
-  </p:cSld>
-  <p:clrMapOvr>
-    <a:masterClrMapping/>
-  </p:clrMapOvr>
-  <p:transition>
-    <p:fade/>
-  </p:transition>
-</p:sld>
-</file>
-
 <file path=ppt/slides/slide6.xml><?xml version="1.0" encoding="utf-8"?>
 <p:sld xmlns:a="http://schemas.openxmlformats.org/drawingml/2006/main" xmlns:r="http://schemas.openxmlformats.org/officeDocument/2006/relationships" xmlns:p="http://schemas.openxmlformats.org/presentationml/2006/main">
   <p:cSld>
@@ -4201,8 +4450,28 @@
           <a:lstStyle/>
           <a:p>
             <a:r>
-              <a:rPr lang="de-DE" dirty="0" smtClean="0"/>
-              <a:t>User</a:t>
+              <a:rPr lang="de-DE" dirty="0" err="1" smtClean="0"/>
+              <a:t>Creating</a:t>
+            </a:r>
+            <a:r>
+              <a:rPr lang="de-DE" dirty="0" smtClean="0"/>
+              <a:t> </a:t>
+            </a:r>
+            <a:r>
+              <a:rPr lang="de-DE" dirty="0" err="1" smtClean="0"/>
+              <a:t>of</a:t>
+            </a:r>
+            <a:r>
+              <a:rPr lang="de-DE" dirty="0" smtClean="0"/>
+              <a:t> </a:t>
+            </a:r>
+            <a:r>
+              <a:rPr lang="de-DE" dirty="0" err="1" smtClean="0"/>
+              <a:t>the</a:t>
+            </a:r>
+            <a:r>
+              <a:rPr lang="de-DE" dirty="0" smtClean="0"/>
+              <a:t> Basic Objects</a:t>
             </a:r>
             <a:endParaRPr lang="de-DE" dirty="0"/>
           </a:p>
@@ -4223,15 +4492,97 @@
           <a:bodyPr/>
           <a:lstStyle/>
           <a:p>
-            <a:r>
-              <a:rPr lang="de-DE" dirty="0" err="1" smtClean="0"/>
-              <a:t>Define</a:t>
+            <a:pPr marL="457200" indent="-457200">
+              <a:buFont typeface="+mj-lt"/>
+              <a:buAutoNum type="arabicPeriod"/>
+            </a:pPr>
+            <a:r>
+              <a:rPr lang="de-DE" dirty="0" smtClean="0"/>
+              <a:t>Create </a:t>
+            </a:r>
+            <a:r>
+              <a:rPr lang="de-DE" dirty="0" err="1" smtClean="0"/>
+              <a:t>Organizational</a:t>
             </a:r>
             <a:r>
               <a:rPr lang="de-DE" dirty="0" smtClean="0"/>
               <a:t> </a:t>
             </a:r>
             <a:r>
+              <a:rPr lang="de-DE" dirty="0" smtClean="0"/>
+              <a:t>Unit</a:t>
+            </a:r>
+          </a:p>
+          <a:p>
+            <a:pPr marL="457200" indent="-457200">
+              <a:buFont typeface="+mj-lt"/>
+              <a:buAutoNum type="arabicPeriod"/>
+            </a:pPr>
+            <a:r>
+              <a:rPr lang="de-DE" dirty="0" smtClean="0"/>
+              <a:t>Set </a:t>
+            </a:r>
+            <a:r>
+              <a:rPr lang="de-DE" dirty="0" err="1" smtClean="0"/>
+              <a:t>status</a:t>
+            </a:r>
+            <a:r>
+              <a:rPr lang="de-DE" dirty="0" smtClean="0"/>
+              <a:t> </a:t>
+            </a:r>
+            <a:r>
+              <a:rPr lang="de-DE" dirty="0" err="1" smtClean="0"/>
+              <a:t>of</a:t>
+            </a:r>
+            <a:r>
+              <a:rPr lang="de-DE" dirty="0" smtClean="0"/>
+              <a:t> OU </a:t>
+            </a:r>
+            <a:r>
+              <a:rPr lang="de-DE" dirty="0" err="1" smtClean="0"/>
+              <a:t>to</a:t>
+            </a:r>
+            <a:r>
+              <a:rPr lang="de-DE" dirty="0" smtClean="0"/>
+              <a:t> ‚open‘</a:t>
+            </a:r>
+            <a:endParaRPr lang="de-DE" dirty="0" smtClean="0"/>
+          </a:p>
+          <a:p>
+            <a:pPr marL="457200" indent="-457200">
+              <a:buFont typeface="+mj-lt"/>
+              <a:buAutoNum type="arabicPeriod"/>
+            </a:pPr>
+            <a:r>
+              <a:rPr lang="de-DE" dirty="0" smtClean="0"/>
+              <a:t>Create </a:t>
+            </a:r>
+            <a:r>
+              <a:rPr lang="de-DE" dirty="0" err="1" smtClean="0"/>
+              <a:t>Context</a:t>
+            </a:r>
+            <a:endParaRPr lang="de-DE" dirty="0" smtClean="0"/>
+          </a:p>
+          <a:p>
+            <a:pPr marL="457200" indent="-457200">
+              <a:buFont typeface="+mj-lt"/>
+              <a:buAutoNum type="arabicPeriod"/>
+            </a:pPr>
+            <a:r>
+              <a:rPr lang="de-DE" dirty="0" smtClean="0"/>
+              <a:t>Create User</a:t>
+            </a:r>
+          </a:p>
+          <a:p>
+            <a:pPr marL="457200" indent="-457200">
+              <a:buFont typeface="+mj-lt"/>
+              <a:buAutoNum type="arabicPeriod"/>
+            </a:pPr>
+            <a:r>
+              <a:rPr lang="de-DE" dirty="0" smtClean="0"/>
+              <a:t>Set </a:t>
+            </a:r>
+            <a:r>
               <a:rPr lang="de-DE" dirty="0" err="1" smtClean="0"/>
               <a:t>user</a:t>
             </a:r>
@@ -4241,146 +4592,54 @@
             </a:r>
             <a:r>
               <a:rPr lang="de-DE" dirty="0" err="1" smtClean="0"/>
-              <a:t>poperties</a:t>
+              <a:t>grant</a:t>
             </a:r>
             <a:endParaRPr lang="de-DE" dirty="0" smtClean="0"/>
           </a:p>
           <a:p>
-            <a:pPr lvl="1"/>
-            <a:r>
-              <a:rPr lang="de-DE" dirty="0" smtClean="0"/>
-              <a:t>Login </a:t>
-            </a:r>
-            <a:r>
-              <a:rPr lang="de-DE" dirty="0" err="1" smtClean="0"/>
-              <a:t>name</a:t>
+            <a:pPr marL="457200" indent="-457200">
+              <a:buFont typeface="+mj-lt"/>
+              <a:buAutoNum type="arabicPeriod"/>
+            </a:pPr>
+            <a:r>
+              <a:rPr lang="de-DE" dirty="0" smtClean="0"/>
+              <a:t>Create </a:t>
+            </a:r>
+            <a:r>
+              <a:rPr lang="de-DE" dirty="0" smtClean="0"/>
+              <a:t>Content Model</a:t>
+            </a:r>
+          </a:p>
+          <a:p>
+            <a:pPr marL="457200" indent="-457200">
+              <a:buFont typeface="+mj-lt"/>
+              <a:buAutoNum type="arabicPeriod"/>
+            </a:pPr>
+            <a:r>
+              <a:rPr lang="de-DE" dirty="0" smtClean="0"/>
+              <a:t>Create </a:t>
+            </a:r>
+            <a:r>
+              <a:rPr lang="de-DE" dirty="0" smtClean="0"/>
+              <a:t>Item </a:t>
             </a:r>
             <a:endParaRPr lang="de-DE" dirty="0" smtClean="0"/>
           </a:p>
           <a:p>
-            <a:pPr lvl="1"/>
-            <a:r>
-              <a:rPr lang="de-DE" dirty="0" err="1" smtClean="0"/>
-              <a:t>Related</a:t>
-            </a:r>
-            <a:r>
-              <a:rPr lang="de-DE" dirty="0" smtClean="0"/>
-              <a:t> </a:t>
-            </a:r>
-            <a:r>
-              <a:rPr lang="de-DE" dirty="0" err="1" smtClean="0"/>
-              <a:t>Organizational</a:t>
-            </a:r>
-            <a:r>
-              <a:rPr lang="de-DE" dirty="0" smtClean="0"/>
-              <a:t> Unit</a:t>
-            </a:r>
-          </a:p>
-          <a:p>
-            <a:pPr lvl="1"/>
-            <a:r>
-              <a:rPr lang="de-DE" dirty="0" smtClean="0"/>
-              <a:t>Real Name </a:t>
-            </a:r>
-            <a:r>
-              <a:rPr lang="de-DE" dirty="0" err="1" smtClean="0"/>
-              <a:t>of</a:t>
-            </a:r>
-            <a:r>
-              <a:rPr lang="de-DE" dirty="0" smtClean="0"/>
-              <a:t> User</a:t>
-            </a:r>
-          </a:p>
-          <a:p>
-            <a:pPr lvl="1"/>
-            <a:r>
-              <a:rPr lang="de-DE" dirty="0" smtClean="0"/>
-              <a:t>Email </a:t>
-            </a:r>
-            <a:r>
-              <a:rPr lang="de-DE" dirty="0" err="1" smtClean="0"/>
-              <a:t>address</a:t>
-            </a:r>
-            <a:endParaRPr lang="de-DE" dirty="0" smtClean="0"/>
-          </a:p>
-          <a:p>
-            <a:pPr lvl="1"/>
-            <a:r>
-              <a:rPr lang="de-DE" dirty="0" smtClean="0"/>
-              <a:t>..</a:t>
-            </a:r>
-          </a:p>
-          <a:p>
-            <a:r>
-              <a:rPr lang="de-DE" dirty="0" err="1" smtClean="0"/>
-              <a:t>Created</a:t>
-            </a:r>
-            <a:r>
-              <a:rPr lang="de-DE" dirty="0" smtClean="0"/>
-              <a:t> </a:t>
-            </a:r>
-            <a:r>
-              <a:rPr lang="de-DE" dirty="0" err="1" smtClean="0"/>
-              <a:t>by</a:t>
-            </a:r>
-            <a:r>
-              <a:rPr lang="de-DE" dirty="0" smtClean="0"/>
-              <a:t> </a:t>
-            </a:r>
-            <a:r>
-              <a:rPr lang="de-DE" dirty="0" err="1" smtClean="0"/>
-              <a:t>user</a:t>
-            </a:r>
-            <a:r>
-              <a:rPr lang="de-DE" dirty="0" smtClean="0"/>
-              <a:t> </a:t>
-            </a:r>
-            <a:r>
-              <a:rPr lang="de-DE" dirty="0" err="1" smtClean="0"/>
-              <a:t>with</a:t>
-            </a:r>
-            <a:r>
-              <a:rPr lang="de-DE" dirty="0" smtClean="0"/>
-              <a:t> </a:t>
-            </a:r>
-            <a:r>
-              <a:rPr lang="de-DE" dirty="0" err="1" smtClean="0"/>
-              <a:t>system</a:t>
-            </a:r>
-            <a:r>
-              <a:rPr lang="de-DE" dirty="0" smtClean="0"/>
-              <a:t> </a:t>
-            </a:r>
-            <a:r>
-              <a:rPr lang="de-DE" dirty="0" err="1" smtClean="0"/>
-              <a:t>administrator</a:t>
-            </a:r>
-            <a:r>
-              <a:rPr lang="de-DE" dirty="0" smtClean="0"/>
-              <a:t> </a:t>
-            </a:r>
-            <a:r>
-              <a:rPr lang="de-DE" dirty="0" err="1" smtClean="0"/>
-              <a:t>grants</a:t>
-            </a:r>
-            <a:endParaRPr lang="de-DE" dirty="0" smtClean="0"/>
-          </a:p>
-          <a:p>
-            <a:r>
-              <a:rPr lang="de-DE" dirty="0" err="1" smtClean="0"/>
-              <a:t>Retrieve</a:t>
-            </a:r>
-            <a:r>
-              <a:rPr lang="de-DE" dirty="0" smtClean="0"/>
-              <a:t/>
-            </a:r>
-            <a:br>
-              <a:rPr lang="de-DE" dirty="0" smtClean="0"/>
-            </a:br>
-            <a:r>
-              <a:rPr lang="de-DE" dirty="0" smtClean="0"/>
-              <a:t>http://&lt;host&gt;/aa/user-account/&lt;objid&gt;</a:t>
-            </a:r>
+            <a:pPr marL="457200" indent="-457200">
+              <a:buFont typeface="+mj-lt"/>
+              <a:buAutoNum type="arabicPeriod"/>
+            </a:pPr>
+            <a:r>
+              <a:rPr lang="de-DE" dirty="0" smtClean="0"/>
+              <a:t>Create </a:t>
+            </a:r>
+            <a:r>
+              <a:rPr lang="de-DE" dirty="0" smtClean="0"/>
+              <a:t>Container</a:t>
+            </a:r>
+          </a:p>
+          <a:p>
             <a:endParaRPr lang="de-DE" dirty="0"/>
           </a:p>
         </p:txBody>
@@ -4430,7 +4689,11 @@
           <a:p>
             <a:r>
               <a:rPr lang="de-DE" dirty="0" err="1" smtClean="0"/>
-              <a:t>Context</a:t>
+              <a:t>Organizational</a:t>
+            </a:r>
+            <a:r>
+              <a:rPr lang="de-DE" dirty="0" smtClean="0"/>
+              <a:t> Unit (OU)</a:t>
             </a:r>
             <a:endParaRPr lang="de-DE" dirty="0"/>
           </a:p>
@@ -4457,11 +4720,26 @@
             </a:r>
             <a:r>
               <a:rPr lang="de-DE" dirty="0" smtClean="0"/>
+              <a:t> OU </a:t>
+            </a:r>
+            <a:r>
+              <a:rPr lang="de-DE" dirty="0" err="1" smtClean="0"/>
+              <a:t>properties</a:t>
+            </a:r>
+            <a:endParaRPr lang="de-DE" dirty="0" smtClean="0"/>
+          </a:p>
+          <a:p>
+            <a:r>
+              <a:rPr lang="de-DE" dirty="0" err="1" smtClean="0"/>
+              <a:t>Created</a:t>
+            </a:r>
+            <a:r>
+              <a:rPr lang="de-DE" dirty="0" smtClean="0"/>
               <a:t> </a:t>
             </a:r>
             <a:r>
               <a:rPr lang="de-DE" dirty="0" err="1" smtClean="0"/>
-              <a:t>Context</a:t>
+              <a:t>by</a:t>
             </a:r>
             <a:r>
               <a:rPr lang="de-DE" dirty="0" smtClean="0"/>
@@ -4469,15 +4747,54 @@
             </a:r>
             <a:r>
               <a:rPr lang="de-DE" dirty="0" err="1" smtClean="0"/>
-              <a:t>properties</a:t>
+              <a:t>user</a:t>
+            </a:r>
+            <a:r>
+              <a:rPr lang="de-DE" dirty="0" smtClean="0"/>
+              <a:t> </a:t>
+            </a:r>
+            <a:r>
+              <a:rPr lang="de-DE" dirty="0" err="1" smtClean="0"/>
+              <a:t>with</a:t>
+            </a:r>
+            <a:r>
+              <a:rPr lang="de-DE" dirty="0" smtClean="0"/>
+              <a:t> </a:t>
+            </a:r>
+            <a:r>
+              <a:rPr lang="de-DE" dirty="0" err="1" smtClean="0"/>
+              <a:t>system</a:t>
+            </a:r>
+            <a:r>
+              <a:rPr lang="de-DE" dirty="0" smtClean="0"/>
+              <a:t> </a:t>
+            </a:r>
+            <a:r>
+              <a:rPr lang="de-DE" dirty="0" err="1" smtClean="0"/>
+              <a:t>administrator</a:t>
+            </a:r>
+            <a:r>
+              <a:rPr lang="de-DE" dirty="0" smtClean="0"/>
+              <a:t> </a:t>
+            </a:r>
+            <a:r>
+              <a:rPr lang="de-DE" dirty="0" err="1" smtClean="0"/>
+              <a:t>grants</a:t>
             </a:r>
             <a:endParaRPr lang="de-DE" dirty="0" smtClean="0"/>
           </a:p>
           <a:p>
-            <a:pPr lvl="1"/>
-            <a:r>
-              <a:rPr lang="de-DE" dirty="0" smtClean="0"/>
-              <a:t>Name </a:t>
+            <a:r>
+              <a:rPr lang="de-DE" dirty="0" smtClean="0"/>
+              <a:t>Set </a:t>
+            </a:r>
+            <a:r>
+              <a:rPr lang="de-DE" dirty="0" err="1" smtClean="0"/>
+              <a:t>status</a:t>
+            </a:r>
+            <a:r>
+              <a:rPr lang="de-DE" dirty="0" smtClean="0"/>
+              <a:t> </a:t>
             </a:r>
             <a:r>
               <a:rPr lang="de-DE" dirty="0" err="1" smtClean="0"/>
@@ -4485,94 +4802,28 @@
             </a:r>
             <a:r>
               <a:rPr lang="de-DE" dirty="0" smtClean="0"/>
+              <a:t> OU </a:t>
+            </a:r>
+            <a:r>
+              <a:rPr lang="de-DE" dirty="0" err="1" smtClean="0"/>
+              <a:t>to</a:t>
+            </a:r>
+            <a:r>
+              <a:rPr lang="de-DE" dirty="0" smtClean="0"/>
               <a:t> </a:t>
             </a:r>
             <a:r>
-              <a:rPr lang="de-DE" dirty="0" err="1" smtClean="0"/>
-              <a:t>Context</a:t>
-            </a:r>
-            <a:endParaRPr lang="de-DE" dirty="0" smtClean="0"/>
-          </a:p>
-          <a:p>
-            <a:pPr lvl="1"/>
-            <a:r>
-              <a:rPr lang="de-DE" dirty="0" smtClean="0"/>
-              <a:t>Description</a:t>
-            </a:r>
-          </a:p>
-          <a:p>
-            <a:pPr lvl="1"/>
-            <a:r>
-              <a:rPr lang="de-DE" dirty="0" err="1" smtClean="0"/>
-              <a:t>Related</a:t>
-            </a:r>
-            <a:r>
-              <a:rPr lang="de-DE" dirty="0" smtClean="0"/>
-              <a:t> </a:t>
-            </a:r>
-            <a:r>
-              <a:rPr lang="de-DE" dirty="0" err="1" smtClean="0"/>
-              <a:t>Organizational</a:t>
-            </a:r>
-            <a:r>
-              <a:rPr lang="de-DE" dirty="0" smtClean="0"/>
-              <a:t> Unit(s)</a:t>
-            </a:r>
-          </a:p>
-          <a:p>
-            <a:r>
-              <a:rPr lang="de-DE" dirty="0" err="1" smtClean="0"/>
-              <a:t>Created</a:t>
-            </a:r>
-            <a:r>
-              <a:rPr lang="de-DE" dirty="0" smtClean="0"/>
-              <a:t> </a:t>
-            </a:r>
-            <a:r>
-              <a:rPr lang="de-DE" dirty="0" err="1" smtClean="0"/>
-              <a:t>by</a:t>
-            </a:r>
-            <a:r>
-              <a:rPr lang="de-DE" dirty="0" smtClean="0"/>
-              <a:t> </a:t>
-            </a:r>
-            <a:r>
-              <a:rPr lang="de-DE" dirty="0" err="1" smtClean="0"/>
-              <a:t>user</a:t>
-            </a:r>
-            <a:r>
-              <a:rPr lang="de-DE" dirty="0" smtClean="0"/>
-              <a:t> </a:t>
-            </a:r>
-            <a:r>
-              <a:rPr lang="de-DE" dirty="0" err="1" smtClean="0"/>
-              <a:t>with</a:t>
-            </a:r>
-            <a:r>
-              <a:rPr lang="de-DE" dirty="0" smtClean="0"/>
-              <a:t> </a:t>
-            </a:r>
-            <a:r>
-              <a:rPr lang="de-DE" dirty="0" err="1" smtClean="0"/>
-              <a:t>system</a:t>
-            </a:r>
-            <a:r>
-              <a:rPr lang="de-DE" dirty="0" smtClean="0"/>
-              <a:t> </a:t>
-            </a:r>
-            <a:r>
-              <a:rPr lang="de-DE" dirty="0" err="1" smtClean="0"/>
-              <a:t>administrator</a:t>
-            </a:r>
-            <a:r>
-              <a:rPr lang="de-DE" dirty="0" smtClean="0"/>
-              <a:t> </a:t>
-            </a:r>
-            <a:r>
-              <a:rPr lang="de-DE" dirty="0" err="1" smtClean="0"/>
-              <a:t>grants</a:t>
-            </a:r>
-            <a:endParaRPr lang="de-DE" dirty="0" smtClean="0"/>
+              <a:rPr lang="de-DE" dirty="0" smtClean="0"/>
+              <a:t>open</a:t>
+            </a:r>
+            <a:r>
+              <a:rPr lang="en-US" dirty="0" smtClean="0"/>
+              <a:t/>
+            </a:r>
+            <a:br>
+              <a:rPr lang="en-US" dirty="0" smtClean="0"/>
+            </a:br>
+            <a:endParaRPr lang="en-US" dirty="0" smtClean="0"/>
           </a:p>
           <a:p>
             <a:r>
@@ -4581,15 +4832,25 @@
             </a:r>
             <a:r>
               <a:rPr lang="de-DE" dirty="0" smtClean="0"/>
+              <a:t>:</a:t>
+            </a:r>
+            <a:br>
+              <a:rPr lang="de-DE" dirty="0" smtClean="0"/>
+            </a:br>
+            <a:r>
+              <a:rPr lang="de-DE" dirty="0" smtClean="0">
+                <a:latin typeface="Courier New" pitchFamily="49" charset="0"/>
+                <a:cs typeface="Courier New" pitchFamily="49" charset="0"/>
+              </a:rPr>
+              <a:t>http://&lt;host&gt;/oum/organizational-unit/&lt;objid&gt; </a:t>
+            </a:r>
+            <a:r>
+              <a:rPr lang="de-DE" dirty="0" smtClean="0"/>
               <a:t/>
             </a:r>
             <a:br>
               <a:rPr lang="de-DE" dirty="0" smtClean="0"/>
             </a:br>
-            <a:r>
-              <a:rPr lang="de-DE" dirty="0" smtClean="0"/>
-              <a:t>http://&lt;host&gt;/ir/context/&lt;objid&gt;</a:t>
-            </a:r>
             <a:endParaRPr lang="de-DE" dirty="0"/>
           </a:p>
         </p:txBody>
@@ -4638,8 +4899,8 @@
           <a:lstStyle/>
           <a:p>
             <a:r>
-              <a:rPr lang="de-DE" dirty="0" smtClean="0"/>
-              <a:t>Content Model</a:t>
+              <a:rPr lang="de-DE" dirty="0" err="1" smtClean="0"/>
+              <a:t>Context</a:t>
             </a:r>
             <a:endParaRPr lang="de-DE" dirty="0"/>
           </a:p>
@@ -4670,6 +4931,14 @@
             </a:r>
             <a:r>
               <a:rPr lang="de-DE" dirty="0" err="1" smtClean="0"/>
+              <a:t>Context</a:t>
+            </a:r>
+            <a:r>
+              <a:rPr lang="de-DE" dirty="0" smtClean="0"/>
+              <a:t> </a:t>
+            </a:r>
+            <a:r>
+              <a:rPr lang="de-DE" dirty="0" err="1" smtClean="0"/>
               <a:t>properties</a:t>
             </a:r>
             <a:endParaRPr lang="de-DE" dirty="0" smtClean="0"/>
@@ -4678,8 +4947,125 @@
             <a:pPr lvl="1"/>
             <a:r>
               <a:rPr lang="de-DE" dirty="0" smtClean="0"/>
-              <a:t>Name</a:t>
-            </a:r>
+              <a:t>Name </a:t>
+            </a:r>
+            <a:r>
+              <a:rPr lang="de-DE" dirty="0" err="1" smtClean="0"/>
+              <a:t>of</a:t>
+            </a:r>
+            <a:r>
+              <a:rPr lang="de-DE" dirty="0" smtClean="0"/>
+              <a:t> </a:t>
+            </a:r>
+            <a:r>
+              <a:rPr lang="de-DE" dirty="0" err="1" smtClean="0"/>
+              <a:t>Context</a:t>
+            </a:r>
+            <a:endParaRPr lang="de-DE" dirty="0" smtClean="0"/>
+          </a:p>
+          <a:p>
+            <a:pPr lvl="1"/>
+            <a:r>
+              <a:rPr lang="de-DE" dirty="0" smtClean="0"/>
+              <a:t>Description</a:t>
+            </a:r>
+          </a:p>
+          <a:p>
+            <a:pPr lvl="1"/>
+            <a:r>
+              <a:rPr lang="de-DE" dirty="0" err="1" smtClean="0"/>
+              <a:t>Related</a:t>
+            </a:r>
+            <a:r>
+              <a:rPr lang="de-DE" dirty="0" smtClean="0"/>
+              <a:t> </a:t>
+            </a:r>
+            <a:r>
+              <a:rPr lang="de-DE" dirty="0" err="1" smtClean="0"/>
+              <a:t>Organizational</a:t>
+            </a:r>
+            <a:r>
+              <a:rPr lang="de-DE" dirty="0" smtClean="0"/>
+              <a:t> Unit(s)</a:t>
+            </a:r>
+          </a:p>
+          <a:p>
+            <a:r>
+              <a:rPr lang="de-DE" dirty="0" err="1" smtClean="0"/>
+              <a:t>Created</a:t>
+            </a:r>
+            <a:r>
+              <a:rPr lang="de-DE" dirty="0" smtClean="0"/>
+              <a:t> </a:t>
+            </a:r>
+            <a:r>
+              <a:rPr lang="de-DE" dirty="0" err="1" smtClean="0"/>
+              <a:t>by</a:t>
+            </a:r>
+            <a:r>
+              <a:rPr lang="de-DE" dirty="0" smtClean="0"/>
+              <a:t> </a:t>
+            </a:r>
+            <a:r>
+              <a:rPr lang="de-DE" dirty="0" err="1" smtClean="0"/>
+              <a:t>user</a:t>
+            </a:r>
+            <a:r>
+              <a:rPr lang="de-DE" dirty="0" smtClean="0"/>
+              <a:t> </a:t>
+            </a:r>
+            <a:r>
+              <a:rPr lang="de-DE" dirty="0" err="1" smtClean="0"/>
+              <a:t>with</a:t>
+            </a:r>
+            <a:r>
+              <a:rPr lang="de-DE" dirty="0" smtClean="0"/>
+              <a:t> </a:t>
+            </a:r>
+            <a:r>
+              <a:rPr lang="de-DE" dirty="0" err="1" smtClean="0"/>
+              <a:t>system</a:t>
+            </a:r>
+            <a:r>
+              <a:rPr lang="de-DE" dirty="0" smtClean="0"/>
+              <a:t> </a:t>
+            </a:r>
+            <a:r>
+              <a:rPr lang="de-DE" dirty="0" err="1" smtClean="0"/>
+              <a:t>administrator</a:t>
+            </a:r>
+            <a:r>
+              <a:rPr lang="de-DE" dirty="0" smtClean="0"/>
+              <a:t> </a:t>
+            </a:r>
+            <a:r>
+              <a:rPr lang="de-DE" dirty="0" err="1" smtClean="0"/>
+              <a:t>grants</a:t>
+            </a:r>
+            <a:endParaRPr lang="de-DE" dirty="0" smtClean="0"/>
+          </a:p>
+          <a:p>
+            <a:r>
+              <a:rPr lang="de-DE" dirty="0" smtClean="0"/>
+              <a:t>Set </a:t>
+            </a:r>
+            <a:r>
+              <a:rPr lang="de-DE" dirty="0" err="1" smtClean="0"/>
+              <a:t>status</a:t>
+            </a:r>
+            <a:r>
+              <a:rPr lang="de-DE" dirty="0" smtClean="0"/>
+              <a:t> </a:t>
+            </a:r>
+            <a:r>
+              <a:rPr lang="de-DE" dirty="0" err="1" smtClean="0"/>
+              <a:t>to</a:t>
+            </a:r>
+            <a:r>
+              <a:rPr lang="de-DE" dirty="0" smtClean="0"/>
+              <a:t> ‚open‘</a:t>
+            </a:r>
+            <a:endParaRPr lang="de-DE" dirty="0" smtClean="0"/>
           </a:p>
           <a:p>
             <a:r>
@@ -4694,10 +5080,16 @@
               <a:rPr lang="de-DE" dirty="0" smtClean="0"/>
             </a:br>
             <a:r>
-              <a:rPr lang="de-DE" dirty="0" smtClean="0"/>
-              <a:t>http://&lt;host&gt;/cmm/content-model/&lt;objid&gt;</a:t>
-            </a:r>
-            <a:endParaRPr lang="de-DE" dirty="0"/>
+              <a:rPr lang="de-DE" sz="2000" dirty="0" smtClean="0">
+                <a:latin typeface="Courier New" pitchFamily="49" charset="0"/>
+                <a:cs typeface="Courier New" pitchFamily="49" charset="0"/>
+              </a:rPr>
+              <a:t>http://&lt;host&gt;/ir/context/&lt;objid&gt;</a:t>
+            </a:r>
+            <a:endParaRPr lang="de-DE" sz="2000" dirty="0">
+              <a:latin typeface="Courier New" pitchFamily="49" charset="0"/>
+              <a:cs typeface="Courier New" pitchFamily="49" charset="0"/>
+            </a:endParaRPr>
           </a:p>
         </p:txBody>
       </p:sp>
@@ -4746,11 +5138,7 @@
           <a:p>
             <a:r>
               <a:rPr lang="de-DE" dirty="0" smtClean="0"/>
-              <a:t>User </a:t>
-            </a:r>
-            <a:r>
-              <a:rPr lang="de-DE" dirty="0" err="1" smtClean="0"/>
-              <a:t>Permission</a:t>
+              <a:t>User</a:t>
             </a:r>
             <a:endParaRPr lang="de-DE" dirty="0"/>
           </a:p>
@@ -4781,14 +5169,35 @@
             </a:r>
             <a:r>
               <a:rPr lang="de-DE" dirty="0" err="1" smtClean="0"/>
-              <a:t>Role</a:t>
+              <a:t>user</a:t>
+            </a:r>
+            <a:r>
+              <a:rPr lang="de-DE" dirty="0" smtClean="0"/>
+              <a:t> </a:t>
+            </a:r>
+            <a:r>
+              <a:rPr lang="de-DE" dirty="0" err="1" smtClean="0"/>
+              <a:t>poperties</a:t>
             </a:r>
             <a:endParaRPr lang="de-DE" dirty="0" smtClean="0"/>
           </a:p>
           <a:p>
-            <a:r>
-              <a:rPr lang="de-DE" dirty="0" err="1" smtClean="0"/>
-              <a:t>Define</a:t>
+            <a:pPr lvl="1"/>
+            <a:r>
+              <a:rPr lang="de-DE" dirty="0" smtClean="0"/>
+              <a:t>Login </a:t>
+            </a:r>
+            <a:r>
+              <a:rPr lang="de-DE" dirty="0" err="1" smtClean="0"/>
+              <a:t>name</a:t>
+            </a:r>
+            <a:endParaRPr lang="de-DE" dirty="0" smtClean="0"/>
+          </a:p>
+          <a:p>
+            <a:pPr lvl="1"/>
+            <a:r>
+              <a:rPr lang="de-DE" dirty="0" err="1" smtClean="0"/>
+              <a:t>Related</a:t>
             </a:r>
             <a:r>
               <a:rPr lang="de-DE" dirty="0" smtClean="0"/>
@@ -4796,12 +5205,100 @@
             </a:r>
             <a:r>
               <a:rPr lang="de-DE" dirty="0" err="1" smtClean="0"/>
-              <a:t>Context</a:t>
+              <a:t>Organizational</a:t>
+            </a:r>
+            <a:r>
+              <a:rPr lang="de-DE" dirty="0" smtClean="0"/>
+              <a:t> Unit</a:t>
+            </a:r>
+          </a:p>
+          <a:p>
+            <a:pPr lvl="1"/>
+            <a:r>
+              <a:rPr lang="de-DE" dirty="0" smtClean="0"/>
+              <a:t>Real Name </a:t>
+            </a:r>
+            <a:r>
+              <a:rPr lang="de-DE" dirty="0" err="1" smtClean="0"/>
+              <a:t>of</a:t>
+            </a:r>
+            <a:r>
+              <a:rPr lang="de-DE" dirty="0" smtClean="0"/>
+              <a:t> User</a:t>
+            </a:r>
+          </a:p>
+          <a:p>
+            <a:pPr lvl="1"/>
+            <a:r>
+              <a:rPr lang="de-DE" dirty="0" smtClean="0"/>
+              <a:t>Email </a:t>
+            </a:r>
+            <a:r>
+              <a:rPr lang="de-DE" dirty="0" err="1" smtClean="0"/>
+              <a:t>address</a:t>
             </a:r>
             <a:endParaRPr lang="de-DE" dirty="0" smtClean="0"/>
           </a:p>
           <a:p>
             <a:pPr lvl="1"/>
+            <a:r>
+              <a:rPr lang="de-DE" dirty="0" smtClean="0"/>
+              <a:t>..</a:t>
+            </a:r>
+          </a:p>
+          <a:p>
+            <a:r>
+              <a:rPr lang="de-DE" dirty="0" err="1" smtClean="0"/>
+              <a:t>Created</a:t>
+            </a:r>
+            <a:r>
+              <a:rPr lang="de-DE" dirty="0" smtClean="0"/>
+              <a:t> </a:t>
+            </a:r>
+            <a:r>
+              <a:rPr lang="de-DE" dirty="0" err="1" smtClean="0"/>
+              <a:t>by</a:t>
+            </a:r>
+            <a:r>
+              <a:rPr lang="de-DE" dirty="0" smtClean="0"/>
+              <a:t> </a:t>
+            </a:r>
+            <a:r>
+              <a:rPr lang="de-DE" dirty="0" err="1" smtClean="0"/>
+              <a:t>user</a:t>
+            </a:r>
+            <a:r>
+              <a:rPr lang="de-DE" dirty="0" smtClean="0"/>
+              <a:t> </a:t>
+            </a:r>
+            <a:r>
+              <a:rPr lang="de-DE" dirty="0" err="1" smtClean="0"/>
+              <a:t>with</a:t>
+            </a:r>
+            <a:r>
+              <a:rPr lang="de-DE" dirty="0" smtClean="0"/>
+              <a:t> </a:t>
+            </a:r>
+            <a:r>
+              <a:rPr lang="de-DE" dirty="0" err="1" smtClean="0"/>
+              <a:t>system</a:t>
+            </a:r>
+            <a:r>
+              <a:rPr lang="de-DE" dirty="0" smtClean="0"/>
+              <a:t> </a:t>
+            </a:r>
+            <a:r>
+              <a:rPr lang="de-DE" dirty="0" err="1" smtClean="0"/>
+              <a:t>administrator</a:t>
+            </a:r>
+            <a:r>
+              <a:rPr lang="de-DE" dirty="0" smtClean="0"/>
+              <a:t> </a:t>
+            </a:r>
+            <a:r>
+              <a:rPr lang="de-DE" dirty="0" err="1" smtClean="0"/>
+              <a:t>grants</a:t>
+            </a:r>
             <a:endParaRPr lang="de-DE" dirty="0" smtClean="0"/>
           </a:p>
           <a:p>
@@ -4817,25 +5314,16 @@
               <a:rPr lang="de-DE" dirty="0" smtClean="0"/>
             </a:br>
             <a:r>
-              <a:rPr lang="de-DE" dirty="0" smtClean="0"/>
-              <a:t>http://&lt;host&gt;/aa/user-account/&lt;objid&gt;/</a:t>
-            </a:r>
-            <a:br>
-              <a:rPr lang="de-DE" dirty="0" smtClean="0"/>
-            </a:br>
-            <a:r>
-              <a:rPr lang="de-DE" dirty="0" err="1" smtClean="0"/>
-              <a:t>resources</a:t>
-            </a:r>
-            <a:r>
-              <a:rPr lang="de-DE" dirty="0" smtClean="0"/>
-              <a:t>/</a:t>
-            </a:r>
-            <a:r>
-              <a:rPr lang="de-DE" dirty="0" err="1" smtClean="0"/>
-              <a:t>current-grants</a:t>
-            </a:r>
-            <a:endParaRPr lang="de-DE" dirty="0"/>
+              <a:rPr lang="de-DE" sz="2000" dirty="0" smtClean="0">
+                <a:latin typeface="Courier New" pitchFamily="49" charset="0"/>
+                <a:cs typeface="Courier New" pitchFamily="49" charset="0"/>
+              </a:rPr>
+              <a:t>http://&lt;host&gt;/aa/user-account/&lt;objid&gt;</a:t>
+            </a:r>
+            <a:endParaRPr lang="de-DE" sz="2000" dirty="0">
+              <a:latin typeface="Courier New" pitchFamily="49" charset="0"/>
+              <a:cs typeface="Courier New" pitchFamily="49" charset="0"/>
+            </a:endParaRPr>
           </a:p>
         </p:txBody>
       </p:sp>

</xml_diff>

<commit_message>
add link to mailing list and website
</commit_message>
<xml_diff>
--- a/doc/presentation.pptx
+++ b/doc/presentation.pptx
@@ -5,7 +5,7 @@
     <p:sldMasterId id="2147483649" r:id="rId1"/>
   </p:sldMasterIdLst>
   <p:notesMasterIdLst>
-    <p:notesMasterId r:id="rId17"/>
+    <p:notesMasterId r:id="rId18"/>
   </p:notesMasterIdLst>
   <p:sldIdLst>
     <p:sldId id="256" r:id="rId2"/>
@@ -23,6 +23,7 @@
     <p:sldId id="307" r:id="rId14"/>
     <p:sldId id="308" r:id="rId15"/>
     <p:sldId id="313" r:id="rId16"/>
+    <p:sldId id="315" r:id="rId17"/>
   </p:sldIdLst>
   <p:sldSz cx="9144000" cy="6858000" type="screen4x3"/>
   <p:notesSz cx="7099300" cy="10234613"/>
@@ -874,7 +875,7 @@
                   <a:spcPct val="50000"/>
                 </a:spcBef>
               </a:pPr>
-              <a:t>20.01.2010</a:t>
+              <a:t>29.03.2010</a:t>
             </a:fld>
             <a:endParaRPr lang="de-DE" sz="1000">
               <a:solidFill>
@@ -2664,7 +2665,7 @@
                   <a:spcPct val="50000"/>
                 </a:spcBef>
               </a:pPr>
-              <a:t>20.01.2010</a:t>
+              <a:t>29.03.2010</a:t>
             </a:fld>
             <a:endParaRPr lang="de-DE" sz="1000">
               <a:solidFill>
@@ -3365,6 +3366,13 @@
   <p:transition>
     <p:fade/>
   </p:transition>
+  <p:timing>
+    <p:tnLst>
+      <p:par>
+        <p:cTn id="1" dur="indefinite" restart="never" nodeType="tmRoot"/>
+      </p:par>
+    </p:tnLst>
+  </p:timing>
 </p:sld>
 </file>
 
@@ -3478,6 +3486,13 @@
   <p:transition>
     <p:fade/>
   </p:transition>
+  <p:timing>
+    <p:tnLst>
+      <p:par>
+        <p:cTn id="1" dur="indefinite" restart="never" nodeType="tmRoot"/>
+      </p:par>
+    </p:tnLst>
+  </p:timing>
 </p:sld>
 </file>
 
@@ -3569,10 +3584,18 @@
           </a:p>
           <a:p>
             <a:r>
-              <a:rPr lang="de-DE" dirty="0" err="1" smtClean="0"/>
-              <a:t>release</a:t>
-            </a:r>
+              <a:rPr lang="de-DE" dirty="0" smtClean="0"/>
+              <a:t>Release</a:t>
+            </a:r>
+          </a:p>
+          <a:p>
             <a:endParaRPr lang="de-DE" dirty="0" smtClean="0"/>
+          </a:p>
+          <a:p>
+            <a:r>
+              <a:rPr lang="de-DE" dirty="0" smtClean="0"/>
+              <a:t>http://&lt;host&gt;/ir/item/&lt;objid&gt;</a:t>
+            </a:r>
           </a:p>
           <a:p>
             <a:pPr lvl="1"/>
@@ -3591,6 +3614,13 @@
   <p:transition>
     <p:fade/>
   </p:transition>
+  <p:timing>
+    <p:tnLst>
+      <p:par>
+        <p:cTn id="1" dur="indefinite" restart="never" nodeType="tmRoot"/>
+      </p:par>
+    </p:tnLst>
+  </p:timing>
 </p:sld>
 </file>
 
@@ -3682,10 +3712,18 @@
           </a:p>
           <a:p>
             <a:r>
-              <a:rPr lang="de-DE" smtClean="0"/>
+              <a:rPr lang="de-DE" dirty="0" smtClean="0"/>
               <a:t>Release</a:t>
             </a:r>
+          </a:p>
+          <a:p>
             <a:endParaRPr lang="de-DE" dirty="0" smtClean="0"/>
+          </a:p>
+          <a:p>
+            <a:r>
+              <a:rPr lang="de-DE" dirty="0" smtClean="0"/>
+              <a:t>http://&lt;host&gt;/ir/container/&lt;objid&gt;</a:t>
+            </a:r>
           </a:p>
         </p:txBody>
       </p:sp>
@@ -3697,6 +3735,13 @@
   <p:transition>
     <p:fade/>
   </p:transition>
+  <p:timing>
+    <p:tnLst>
+      <p:par>
+        <p:cTn id="1" dur="indefinite" restart="never" nodeType="tmRoot"/>
+      </p:par>
+    </p:tnLst>
+  </p:timing>
 </p:sld>
 </file>
 
@@ -3798,6 +3843,13 @@
   <p:transition>
     <p:fade/>
   </p:transition>
+  <p:timing>
+    <p:tnLst>
+      <p:par>
+        <p:cTn id="1" dur="indefinite" restart="never" nodeType="tmRoot"/>
+      </p:par>
+    </p:tnLst>
+  </p:timing>
 </p:sld>
 </file>
 
@@ -3919,6 +3971,120 @@
   <p:transition>
     <p:fade/>
   </p:transition>
+  <p:timing>
+    <p:tnLst>
+      <p:par>
+        <p:cTn id="1" dur="indefinite" restart="never" nodeType="tmRoot"/>
+      </p:par>
+    </p:tnLst>
+  </p:timing>
+</p:sld>
+</file>
+
+<file path=ppt/slides/slide16.xml><?xml version="1.0" encoding="utf-8"?>
+<p:sld xmlns:a="http://schemas.openxmlformats.org/drawingml/2006/main" xmlns:r="http://schemas.openxmlformats.org/officeDocument/2006/relationships" xmlns:p="http://schemas.openxmlformats.org/presentationml/2006/main">
+  <p:cSld>
+    <p:spTree>
+      <p:nvGrpSpPr>
+        <p:cNvPr id="1" name=""/>
+        <p:cNvGrpSpPr/>
+        <p:nvPr/>
+      </p:nvGrpSpPr>
+      <p:grpSpPr>
+        <a:xfrm>
+          <a:off x="0" y="0"/>
+          <a:ext cx="0" cy="0"/>
+          <a:chOff x="0" y="0"/>
+          <a:chExt cx="0" cy="0"/>
+        </a:xfrm>
+      </p:grpSpPr>
+      <p:sp>
+        <p:nvSpPr>
+          <p:cNvPr id="2" name="Titel 1"/>
+          <p:cNvSpPr>
+            <a:spLocks noGrp="1"/>
+          </p:cNvSpPr>
+          <p:nvPr>
+            <p:ph type="title"/>
+          </p:nvPr>
+        </p:nvSpPr>
+        <p:spPr/>
+        <p:txBody>
+          <a:bodyPr/>
+          <a:lstStyle/>
+          <a:p>
+            <a:r>
+              <a:rPr lang="de-DE" dirty="0" err="1" smtClean="0"/>
+              <a:t>Thanks</a:t>
+            </a:r>
+            <a:r>
+              <a:rPr lang="de-DE" dirty="0" smtClean="0"/>
+              <a:t>! </a:t>
+            </a:r>
+            <a:r>
+              <a:rPr lang="de-DE" dirty="0" err="1" smtClean="0"/>
+              <a:t>Questions</a:t>
+            </a:r>
+            <a:r>
+              <a:rPr lang="de-DE" dirty="0" smtClean="0"/>
+              <a:t>?</a:t>
+            </a:r>
+            <a:endParaRPr lang="de-DE" dirty="0"/>
+          </a:p>
+        </p:txBody>
+      </p:sp>
+      <p:sp>
+        <p:nvSpPr>
+          <p:cNvPr id="3" name="Inhaltsplatzhalter 2"/>
+          <p:cNvSpPr>
+            <a:spLocks noGrp="1"/>
+          </p:cNvSpPr>
+          <p:nvPr>
+            <p:ph idx="1"/>
+          </p:nvPr>
+        </p:nvSpPr>
+        <p:spPr/>
+        <p:txBody>
+          <a:bodyPr/>
+          <a:lstStyle/>
+          <a:p>
+            <a:r>
+              <a:rPr lang="de-DE" dirty="0" smtClean="0">
+                <a:hlinkClick r:id="rId2"/>
+              </a:rPr>
+              <a:t>infrastructure-user@escidoc.org</a:t>
+            </a:r>
+            <a:endParaRPr lang="de-DE" dirty="0" smtClean="0"/>
+          </a:p>
+          <a:p>
+            <a:r>
+              <a:rPr lang="de-DE" dirty="0" smtClean="0">
+                <a:hlinkClick r:id="rId3"/>
+              </a:rPr>
+              <a:t>www.escidoc.org</a:t>
+            </a:r>
+            <a:endParaRPr lang="de-DE" dirty="0" smtClean="0"/>
+          </a:p>
+          <a:p>
+            <a:endParaRPr lang="de-DE" dirty="0"/>
+          </a:p>
+        </p:txBody>
+      </p:sp>
+    </p:spTree>
+  </p:cSld>
+  <p:clrMapOvr>
+    <a:masterClrMapping/>
+  </p:clrMapOvr>
+  <p:transition>
+    <p:fade/>
+  </p:transition>
+  <p:timing>
+    <p:tnLst>
+      <p:par>
+        <p:cTn id="1" dur="indefinite" restart="never" nodeType="tmRoot"/>
+      </p:par>
+    </p:tnLst>
+  </p:timing>
 </p:sld>
 </file>
 
@@ -3985,7 +4151,17 @@
               <a:rPr lang="de-DE" dirty="0" err="1" smtClean="0"/>
               <a:t>representation</a:t>
             </a:r>
-            <a:endParaRPr lang="de-DE" dirty="0" smtClean="0"/>
+            <a:r>
+              <a:rPr lang="de-DE" dirty="0" smtClean="0"/>
+              <a:t/>
+            </a:r>
+            <a:br>
+              <a:rPr lang="de-DE" dirty="0" smtClean="0"/>
+            </a:br>
+            <a:r>
+              <a:rPr lang="de-DE" dirty="0" smtClean="0"/>
+              <a:t>http://&lt;host&gt;:8080/ir/item/escidoc:ex5</a:t>
+            </a:r>
           </a:p>
           <a:p>
             <a:r>
@@ -4054,6 +4230,13 @@
   <p:transition>
     <p:fade/>
   </p:transition>
+  <p:timing>
+    <p:tnLst>
+      <p:par>
+        <p:cTn id="1" dur="indefinite" restart="never" nodeType="tmRoot"/>
+      </p:par>
+    </p:tnLst>
+  </p:timing>
 </p:sld>
 </file>
 
@@ -4170,6 +4353,13 @@
   <p:transition>
     <p:fade/>
   </p:transition>
+  <p:timing>
+    <p:tnLst>
+      <p:par>
+        <p:cTn id="1" dur="indefinite" restart="never" nodeType="tmRoot"/>
+      </p:par>
+    </p:tnLst>
+  </p:timing>
 </p:sld>
 </file>
 
@@ -4320,6 +4510,13 @@
   <p:transition>
     <p:fade/>
   </p:transition>
+  <p:timing>
+    <p:tnLst>
+      <p:par>
+        <p:cTn id="1" dur="indefinite" restart="never" nodeType="tmRoot"/>
+      </p:par>
+    </p:tnLst>
+  </p:timing>
 </p:sld>
 </file>
 
@@ -4383,6 +4580,13 @@
   <p:transition>
     <p:fade/>
   </p:transition>
+  <p:timing>
+    <p:tnLst>
+      <p:par>
+        <p:cTn id="1" dur="indefinite" restart="never" nodeType="tmRoot"/>
+      </p:par>
+    </p:tnLst>
+  </p:timing>
 </p:sld>
 </file>
 
@@ -4603,6 +4807,13 @@
   <p:transition>
     <p:fade/>
   </p:transition>
+  <p:timing>
+    <p:tnLst>
+      <p:par>
+        <p:cTn id="1" dur="indefinite" restart="never" nodeType="tmRoot"/>
+      </p:par>
+    </p:tnLst>
+  </p:timing>
 </p:sld>
 </file>
 
@@ -4810,6 +5021,13 @@
   <p:transition>
     <p:fade/>
   </p:transition>
+  <p:timing>
+    <p:tnLst>
+      <p:par>
+        <p:cTn id="1" dur="indefinite" restart="never" nodeType="tmRoot"/>
+      </p:par>
+    </p:tnLst>
+  </p:timing>
 </p:sld>
 </file>
 
@@ -5047,6 +5265,13 @@
   <p:transition>
     <p:fade/>
   </p:transition>
+  <p:timing>
+    <p:tnLst>
+      <p:par>
+        <p:cTn id="1" dur="indefinite" restart="never" nodeType="tmRoot"/>
+      </p:par>
+    </p:tnLst>
+  </p:timing>
 </p:sld>
 </file>
 
@@ -5281,6 +5506,13 @@
   <p:transition>
     <p:fade/>
   </p:transition>
+  <p:timing>
+    <p:tnLst>
+      <p:par>
+        <p:cTn id="1" dur="indefinite" restart="never" nodeType="tmRoot"/>
+      </p:par>
+    </p:tnLst>
+  </p:timing>
 </p:sld>
 </file>
 

</xml_diff>